<commit_message>
Created Django Project and app
</commit_message>
<xml_diff>
--- a/setup.pptx
+++ b/setup.pptx
@@ -9,6 +9,12 @@
     <p:sldId id="258" r:id="rId3"/>
     <p:sldId id="259" r:id="rId4"/>
     <p:sldId id="261" r:id="rId5"/>
+    <p:sldId id="262" r:id="rId6"/>
+    <p:sldId id="263" r:id="rId7"/>
+    <p:sldId id="264" r:id="rId8"/>
+    <p:sldId id="265" r:id="rId9"/>
+    <p:sldId id="266" r:id="rId10"/>
+    <p:sldId id="267" r:id="rId11"/>
   </p:sldIdLst>
   <p:sldSz cx="12192000" cy="6858000"/>
   <p:notesSz cx="6858000" cy="9144000"/>
@@ -107,6 +113,11 @@
       </a:defRPr>
     </a:lvl9pPr>
   </p:defaultTextStyle>
+  <p:extLst>
+    <p:ext uri="{EFAFB233-063F-42B5-8137-9DF3F51BA10A}">
+      <p15:sldGuideLst xmlns:p15="http://schemas.microsoft.com/office/powerpoint/2012/main"/>
+    </p:ext>
+  </p:extLst>
 </p:presentation>
 </file>
 
@@ -259,7 +270,7 @@
           <a:p>
             <a:fld id="{DBE5E07E-E33F-4296-ACDE-B7BF5645D92B}" type="datetimeFigureOut">
               <a:rPr lang="en-CA" smtClean="0"/>
-              <a:t>2021-12-21</a:t>
+              <a:t>2021-12-23</a:t>
             </a:fld>
             <a:endParaRPr lang="en-CA"/>
           </a:p>
@@ -459,7 +470,7 @@
           <a:p>
             <a:fld id="{DBE5E07E-E33F-4296-ACDE-B7BF5645D92B}" type="datetimeFigureOut">
               <a:rPr lang="en-CA" smtClean="0"/>
-              <a:t>2021-12-21</a:t>
+              <a:t>2021-12-23</a:t>
             </a:fld>
             <a:endParaRPr lang="en-CA"/>
           </a:p>
@@ -669,7 +680,7 @@
           <a:p>
             <a:fld id="{DBE5E07E-E33F-4296-ACDE-B7BF5645D92B}" type="datetimeFigureOut">
               <a:rPr lang="en-CA" smtClean="0"/>
-              <a:t>2021-12-21</a:t>
+              <a:t>2021-12-23</a:t>
             </a:fld>
             <a:endParaRPr lang="en-CA"/>
           </a:p>
@@ -869,7 +880,7 @@
           <a:p>
             <a:fld id="{DBE5E07E-E33F-4296-ACDE-B7BF5645D92B}" type="datetimeFigureOut">
               <a:rPr lang="en-CA" smtClean="0"/>
-              <a:t>2021-12-21</a:t>
+              <a:t>2021-12-23</a:t>
             </a:fld>
             <a:endParaRPr lang="en-CA"/>
           </a:p>
@@ -1145,7 +1156,7 @@
           <a:p>
             <a:fld id="{DBE5E07E-E33F-4296-ACDE-B7BF5645D92B}" type="datetimeFigureOut">
               <a:rPr lang="en-CA" smtClean="0"/>
-              <a:t>2021-12-21</a:t>
+              <a:t>2021-12-23</a:t>
             </a:fld>
             <a:endParaRPr lang="en-CA"/>
           </a:p>
@@ -1413,7 +1424,7 @@
           <a:p>
             <a:fld id="{DBE5E07E-E33F-4296-ACDE-B7BF5645D92B}" type="datetimeFigureOut">
               <a:rPr lang="en-CA" smtClean="0"/>
-              <a:t>2021-12-21</a:t>
+              <a:t>2021-12-23</a:t>
             </a:fld>
             <a:endParaRPr lang="en-CA"/>
           </a:p>
@@ -1828,7 +1839,7 @@
           <a:p>
             <a:fld id="{DBE5E07E-E33F-4296-ACDE-B7BF5645D92B}" type="datetimeFigureOut">
               <a:rPr lang="en-CA" smtClean="0"/>
-              <a:t>2021-12-21</a:t>
+              <a:t>2021-12-23</a:t>
             </a:fld>
             <a:endParaRPr lang="en-CA"/>
           </a:p>
@@ -1970,7 +1981,7 @@
           <a:p>
             <a:fld id="{DBE5E07E-E33F-4296-ACDE-B7BF5645D92B}" type="datetimeFigureOut">
               <a:rPr lang="en-CA" smtClean="0"/>
-              <a:t>2021-12-21</a:t>
+              <a:t>2021-12-23</a:t>
             </a:fld>
             <a:endParaRPr lang="en-CA"/>
           </a:p>
@@ -2083,7 +2094,7 @@
           <a:p>
             <a:fld id="{DBE5E07E-E33F-4296-ACDE-B7BF5645D92B}" type="datetimeFigureOut">
               <a:rPr lang="en-CA" smtClean="0"/>
-              <a:t>2021-12-21</a:t>
+              <a:t>2021-12-23</a:t>
             </a:fld>
             <a:endParaRPr lang="en-CA"/>
           </a:p>
@@ -2396,7 +2407,7 @@
           <a:p>
             <a:fld id="{DBE5E07E-E33F-4296-ACDE-B7BF5645D92B}" type="datetimeFigureOut">
               <a:rPr lang="en-CA" smtClean="0"/>
-              <a:t>2021-12-21</a:t>
+              <a:t>2021-12-23</a:t>
             </a:fld>
             <a:endParaRPr lang="en-CA"/>
           </a:p>
@@ -2685,7 +2696,7 @@
           <a:p>
             <a:fld id="{DBE5E07E-E33F-4296-ACDE-B7BF5645D92B}" type="datetimeFigureOut">
               <a:rPr lang="en-CA" smtClean="0"/>
-              <a:t>2021-12-21</a:t>
+              <a:t>2021-12-23</a:t>
             </a:fld>
             <a:endParaRPr lang="en-CA"/>
           </a:p>
@@ -2928,7 +2939,7 @@
           <a:p>
             <a:fld id="{DBE5E07E-E33F-4296-ACDE-B7BF5645D92B}" type="datetimeFigureOut">
               <a:rPr lang="en-CA" smtClean="0"/>
-              <a:t>2021-12-21</a:t>
+              <a:t>2021-12-23</a:t>
             </a:fld>
             <a:endParaRPr lang="en-CA"/>
           </a:p>
@@ -3412,6 +3423,225 @@
 </p:sld>
 </file>
 
+<file path=ppt/slides/slide10.xml><?xml version="1.0" encoding="utf-8"?>
+<p:sld xmlns:a="http://schemas.openxmlformats.org/drawingml/2006/main" xmlns:r="http://schemas.openxmlformats.org/officeDocument/2006/relationships" xmlns:p="http://schemas.openxmlformats.org/presentationml/2006/main">
+  <p:cSld>
+    <p:spTree>
+      <p:nvGrpSpPr>
+        <p:cNvPr id="1" name=""/>
+        <p:cNvGrpSpPr/>
+        <p:nvPr/>
+      </p:nvGrpSpPr>
+      <p:grpSpPr>
+        <a:xfrm>
+          <a:off x="0" y="0"/>
+          <a:ext cx="0" cy="0"/>
+          <a:chOff x="0" y="0"/>
+          <a:chExt cx="0" cy="0"/>
+        </a:xfrm>
+      </p:grpSpPr>
+      <p:sp>
+        <p:nvSpPr>
+          <p:cNvPr id="2" name="Title 1">
+            <a:extLst>
+              <a:ext uri="{FF2B5EF4-FFF2-40B4-BE49-F238E27FC236}">
+                <a16:creationId xmlns:a16="http://schemas.microsoft.com/office/drawing/2014/main" id="{43BA7965-3D77-4DA8-A1D4-B23BD3FAFF41}"/>
+              </a:ext>
+            </a:extLst>
+          </p:cNvPr>
+          <p:cNvSpPr>
+            <a:spLocks noGrp="1"/>
+          </p:cNvSpPr>
+          <p:nvPr>
+            <p:ph type="title"/>
+          </p:nvPr>
+        </p:nvSpPr>
+        <p:spPr/>
+        <p:txBody>
+          <a:bodyPr/>
+          <a:lstStyle/>
+          <a:p>
+            <a:r>
+              <a:rPr lang="en-CA" dirty="0"/>
+              <a:t>Cont.</a:t>
+            </a:r>
+          </a:p>
+        </p:txBody>
+      </p:sp>
+      <p:sp>
+        <p:nvSpPr>
+          <p:cNvPr id="3" name="Content Placeholder 2">
+            <a:extLst>
+              <a:ext uri="{FF2B5EF4-FFF2-40B4-BE49-F238E27FC236}">
+                <a16:creationId xmlns:a16="http://schemas.microsoft.com/office/drawing/2014/main" id="{F57D903F-2263-4163-A72B-D64A09334308}"/>
+              </a:ext>
+            </a:extLst>
+          </p:cNvPr>
+          <p:cNvSpPr>
+            <a:spLocks noGrp="1"/>
+          </p:cNvSpPr>
+          <p:nvPr>
+            <p:ph idx="1"/>
+          </p:nvPr>
+        </p:nvSpPr>
+        <p:spPr/>
+        <p:txBody>
+          <a:bodyPr/>
+          <a:lstStyle/>
+          <a:p>
+            <a:r>
+              <a:rPr lang="en-CA" dirty="0"/>
+              <a:t>Finally You’ve completely setup your Django rest app project. Don’t believe it? Try this:</a:t>
+            </a:r>
+          </a:p>
+          <a:p>
+            <a:pPr lvl="1"/>
+            <a:r>
+              <a:rPr lang="en-CA" dirty="0"/>
+              <a:t>Run this script: </a:t>
+            </a:r>
+            <a:r>
+              <a:rPr lang="en-CA" sz="1800" i="1" dirty="0">
+                <a:solidFill>
+                  <a:prstClr val="black"/>
+                </a:solidFill>
+                <a:effectLst>
+                  <a:outerShdw blurRad="38100" dist="38100" dir="2700000" algn="tl">
+                    <a:srgbClr val="000000">
+                      <a:alpha val="43137"/>
+                    </a:srgbClr>
+                  </a:outerShdw>
+                </a:effectLst>
+                <a:latin typeface="Lucida Console" panose="020B0609040504020204" pitchFamily="49" charset="0"/>
+              </a:rPr>
+              <a:t>python manage.py </a:t>
+            </a:r>
+            <a:r>
+              <a:rPr lang="en-CA" sz="1800" i="1" dirty="0" err="1">
+                <a:solidFill>
+                  <a:prstClr val="black"/>
+                </a:solidFill>
+                <a:effectLst>
+                  <a:outerShdw blurRad="38100" dist="38100" dir="2700000" algn="tl">
+                    <a:srgbClr val="000000">
+                      <a:alpha val="43137"/>
+                    </a:srgbClr>
+                  </a:outerShdw>
+                </a:effectLst>
+                <a:latin typeface="Lucida Console" panose="020B0609040504020204" pitchFamily="49" charset="0"/>
+              </a:rPr>
+              <a:t>runserver</a:t>
+            </a:r>
+            <a:r>
+              <a:rPr lang="en-CA" sz="1800" i="1" dirty="0">
+                <a:solidFill>
+                  <a:prstClr val="black"/>
+                </a:solidFill>
+                <a:effectLst>
+                  <a:outerShdw blurRad="38100" dist="38100" dir="2700000" algn="tl">
+                    <a:srgbClr val="000000">
+                      <a:alpha val="43137"/>
+                    </a:srgbClr>
+                  </a:outerShdw>
+                </a:effectLst>
+                <a:latin typeface="Lucida Console" panose="020B0609040504020204" pitchFamily="49" charset="0"/>
+              </a:rPr>
+              <a:t> 0.0.0.0:8000</a:t>
+            </a:r>
+            <a:endParaRPr lang="en-CA" sz="1800" dirty="0">
+              <a:solidFill>
+                <a:prstClr val="black"/>
+              </a:solidFill>
+              <a:latin typeface="Lucida Console" panose="020B0609040504020204" pitchFamily="49" charset="0"/>
+            </a:endParaRPr>
+          </a:p>
+          <a:p>
+            <a:pPr lvl="2"/>
+            <a:r>
+              <a:rPr lang="en-CA" dirty="0">
+                <a:solidFill>
+                  <a:prstClr val="black"/>
+                </a:solidFill>
+              </a:rPr>
+              <a:t>Note: change the port number according to your own specified port. Go to the vagrant file and check which port are you using for the host and guest network.</a:t>
+            </a:r>
+          </a:p>
+          <a:p>
+            <a:pPr lvl="2"/>
+            <a:r>
+              <a:rPr lang="en-CA" dirty="0">
+                <a:solidFill>
+                  <a:prstClr val="black"/>
+                </a:solidFill>
+              </a:rPr>
+              <a:t>Open the browser and search the url: localhost:8000</a:t>
+            </a:r>
+          </a:p>
+          <a:p>
+            <a:pPr lvl="2"/>
+            <a:r>
+              <a:rPr lang="en-CA" dirty="0"/>
+              <a:t>If you see something like these shown in the bottom right corner, </a:t>
+            </a:r>
+            <a:r>
+              <a:rPr lang="en-CA" dirty="0" err="1"/>
+              <a:t>yey</a:t>
+            </a:r>
+            <a:r>
+              <a:rPr lang="en-CA" dirty="0"/>
+              <a:t>! Everything worked </a:t>
+            </a:r>
+            <a:r>
+              <a:rPr lang="en-CA"/>
+              <a:t>as expected.</a:t>
+            </a:r>
+            <a:endParaRPr lang="en-CA" dirty="0"/>
+          </a:p>
+        </p:txBody>
+      </p:sp>
+      <p:pic>
+        <p:nvPicPr>
+          <p:cNvPr id="5" name="Picture 4">
+            <a:extLst>
+              <a:ext uri="{FF2B5EF4-FFF2-40B4-BE49-F238E27FC236}">
+                <a16:creationId xmlns:a16="http://schemas.microsoft.com/office/drawing/2014/main" id="{A2FC490C-380E-4002-BB79-A0A79E95D096}"/>
+              </a:ext>
+            </a:extLst>
+          </p:cNvPr>
+          <p:cNvPicPr>
+            <a:picLocks noChangeAspect="1"/>
+          </p:cNvPicPr>
+          <p:nvPr/>
+        </p:nvPicPr>
+        <p:blipFill>
+          <a:blip r:embed="rId2"/>
+          <a:stretch>
+            <a:fillRect/>
+          </a:stretch>
+        </p:blipFill>
+        <p:spPr>
+          <a:xfrm>
+            <a:off x="9272589" y="4296855"/>
+            <a:ext cx="2919412" cy="2561145"/>
+          </a:xfrm>
+          <a:prstGeom prst="rect">
+            <a:avLst/>
+          </a:prstGeom>
+        </p:spPr>
+      </p:pic>
+    </p:spTree>
+    <p:extLst>
+      <p:ext uri="{BB962C8B-B14F-4D97-AF65-F5344CB8AC3E}">
+        <p14:creationId xmlns:p14="http://schemas.microsoft.com/office/powerpoint/2010/main" val="3878923198"/>
+      </p:ext>
+    </p:extLst>
+  </p:cSld>
+  <p:clrMapOvr>
+    <a:masterClrMapping/>
+  </p:clrMapOvr>
+</p:sld>
+</file>
+
 <file path=ppt/slides/slide2.xml><?xml version="1.0" encoding="utf-8"?>
 <p:sld xmlns:a="http://schemas.openxmlformats.org/drawingml/2006/main" xmlns:r="http://schemas.openxmlformats.org/officeDocument/2006/relationships" xmlns:p="http://schemas.openxmlformats.org/presentationml/2006/main">
   <p:cSld>
@@ -3739,7 +3969,7 @@
           <a:p>
             <a:r>
               <a:rPr lang="en-US" dirty="0"/>
-              <a:t>Steps</a:t>
+              <a:t>Initial Setup</a:t>
             </a:r>
             <a:endParaRPr lang="en-CA" dirty="0"/>
           </a:p>
@@ -3875,6 +4105,13 @@
               <a:rPr lang="en-US" dirty="0"/>
               <a:t>. It downloads the based image that we specified in our vagrant file, and it’ll create virtual box to create new virtual machine and run scripts when we starts the machine.</a:t>
             </a:r>
+          </a:p>
+          <a:p>
+            <a:pPr lvl="2"/>
+            <a:r>
+              <a:rPr lang="en-US" dirty="0"/>
+              <a:t>Note: You might get an error with the latest image files. If that’s a case and you can’t find any solution from the internet, email the error to this id: sshah1885@conestogac.on.ca</a:t>
+            </a:r>
             <a:endParaRPr lang="en-CA" dirty="0"/>
           </a:p>
         </p:txBody>
@@ -3883,6 +4120,1140 @@
     <p:extLst>
       <p:ext uri="{BB962C8B-B14F-4D97-AF65-F5344CB8AC3E}">
         <p14:creationId xmlns:p14="http://schemas.microsoft.com/office/powerpoint/2010/main" val="2803880064"/>
+      </p:ext>
+    </p:extLst>
+  </p:cSld>
+  <p:clrMapOvr>
+    <a:masterClrMapping/>
+  </p:clrMapOvr>
+</p:sld>
+</file>
+
+<file path=ppt/slides/slide5.xml><?xml version="1.0" encoding="utf-8"?>
+<p:sld xmlns:a="http://schemas.openxmlformats.org/drawingml/2006/main" xmlns:r="http://schemas.openxmlformats.org/officeDocument/2006/relationships" xmlns:p="http://schemas.openxmlformats.org/presentationml/2006/main">
+  <p:cSld>
+    <p:spTree>
+      <p:nvGrpSpPr>
+        <p:cNvPr id="1" name=""/>
+        <p:cNvGrpSpPr/>
+        <p:nvPr/>
+      </p:nvGrpSpPr>
+      <p:grpSpPr>
+        <a:xfrm>
+          <a:off x="0" y="0"/>
+          <a:ext cx="0" cy="0"/>
+          <a:chOff x="0" y="0"/>
+          <a:chExt cx="0" cy="0"/>
+        </a:xfrm>
+      </p:grpSpPr>
+      <p:sp>
+        <p:nvSpPr>
+          <p:cNvPr id="2" name="Title 1">
+            <a:extLst>
+              <a:ext uri="{FF2B5EF4-FFF2-40B4-BE49-F238E27FC236}">
+                <a16:creationId xmlns:a16="http://schemas.microsoft.com/office/drawing/2014/main" id="{4F189CA2-C104-46A1-806B-DF5F686EFBE7}"/>
+              </a:ext>
+            </a:extLst>
+          </p:cNvPr>
+          <p:cNvSpPr>
+            <a:spLocks noGrp="1"/>
+          </p:cNvSpPr>
+          <p:nvPr>
+            <p:ph type="title"/>
+          </p:nvPr>
+        </p:nvSpPr>
+        <p:spPr/>
+        <p:txBody>
+          <a:bodyPr/>
+          <a:lstStyle/>
+          <a:p>
+            <a:r>
+              <a:rPr lang="en-US" dirty="0"/>
+              <a:t>Cont.</a:t>
+            </a:r>
+            <a:endParaRPr lang="en-CA" dirty="0"/>
+          </a:p>
+        </p:txBody>
+      </p:sp>
+      <p:sp>
+        <p:nvSpPr>
+          <p:cNvPr id="3" name="Content Placeholder 2">
+            <a:extLst>
+              <a:ext uri="{FF2B5EF4-FFF2-40B4-BE49-F238E27FC236}">
+                <a16:creationId xmlns:a16="http://schemas.microsoft.com/office/drawing/2014/main" id="{0D57AAB0-000C-4AE3-B759-5BEFB2E0B67A}"/>
+              </a:ext>
+            </a:extLst>
+          </p:cNvPr>
+          <p:cNvSpPr>
+            <a:spLocks noGrp="1"/>
+          </p:cNvSpPr>
+          <p:nvPr>
+            <p:ph idx="1"/>
+          </p:nvPr>
+        </p:nvSpPr>
+        <p:spPr/>
+        <p:txBody>
+          <a:bodyPr/>
+          <a:lstStyle/>
+          <a:p>
+            <a:r>
+              <a:rPr lang="en-US" dirty="0"/>
+              <a:t>Vagrant Setup(cont.):</a:t>
+            </a:r>
+          </a:p>
+          <a:p>
+            <a:pPr lvl="1"/>
+            <a:r>
+              <a:rPr lang="en-CA" dirty="0"/>
+              <a:t>Once the virtual machine is being setup, to connect the </a:t>
+            </a:r>
+            <a:r>
+              <a:rPr lang="en-CA" dirty="0" err="1"/>
+              <a:t>vm</a:t>
+            </a:r>
+            <a:r>
+              <a:rPr lang="en-CA" dirty="0"/>
+              <a:t>, type the command: </a:t>
+            </a:r>
+            <a:r>
+              <a:rPr lang="en-CA" i="1" dirty="0">
+                <a:effectLst>
+                  <a:outerShdw blurRad="38100" dist="38100" dir="2700000" algn="tl">
+                    <a:srgbClr val="000000">
+                      <a:alpha val="43137"/>
+                    </a:srgbClr>
+                  </a:outerShdw>
+                </a:effectLst>
+              </a:rPr>
+              <a:t>vagrant </a:t>
+            </a:r>
+            <a:r>
+              <a:rPr lang="en-CA" i="1" dirty="0" err="1">
+                <a:effectLst>
+                  <a:outerShdw blurRad="38100" dist="38100" dir="2700000" algn="tl">
+                    <a:srgbClr val="000000">
+                      <a:alpha val="43137"/>
+                    </a:srgbClr>
+                  </a:outerShdw>
+                </a:effectLst>
+              </a:rPr>
+              <a:t>ssh</a:t>
+            </a:r>
+            <a:endParaRPr lang="en-CA" i="1" dirty="0">
+              <a:effectLst>
+                <a:outerShdw blurRad="38100" dist="38100" dir="2700000" algn="tl">
+                  <a:srgbClr val="000000">
+                    <a:alpha val="43137"/>
+                  </a:srgbClr>
+                </a:outerShdw>
+              </a:effectLst>
+            </a:endParaRPr>
+          </a:p>
+          <a:p>
+            <a:pPr lvl="1"/>
+            <a:r>
+              <a:rPr lang="en-CA" dirty="0"/>
+              <a:t>To disconnect, use command: </a:t>
+            </a:r>
+            <a:r>
+              <a:rPr lang="en-CA" i="1" dirty="0">
+                <a:effectLst>
+                  <a:outerShdw blurRad="38100" dist="38100" dir="2700000" algn="tl">
+                    <a:srgbClr val="000000">
+                      <a:alpha val="43137"/>
+                    </a:srgbClr>
+                  </a:outerShdw>
+                </a:effectLst>
+              </a:rPr>
+              <a:t>exit</a:t>
+            </a:r>
+            <a:r>
+              <a:rPr lang="en-CA" dirty="0"/>
+              <a:t>.</a:t>
+            </a:r>
+          </a:p>
+          <a:p>
+            <a:pPr lvl="1"/>
+            <a:endParaRPr lang="en-CA" dirty="0"/>
+          </a:p>
+          <a:p>
+            <a:r>
+              <a:rPr lang="en-CA" dirty="0"/>
+              <a:t>Note: now the vagrant ( ubuntu server) is linked to your local project.</a:t>
+            </a:r>
+          </a:p>
+          <a:p>
+            <a:pPr lvl="1"/>
+            <a:r>
+              <a:rPr lang="en-CA" dirty="0"/>
+              <a:t>Any changes made from ubuntu server will affect local files and vis a versa.</a:t>
+            </a:r>
+          </a:p>
+          <a:p>
+            <a:pPr lvl="1"/>
+            <a:endParaRPr lang="en-CA" dirty="0"/>
+          </a:p>
+        </p:txBody>
+      </p:sp>
+    </p:spTree>
+    <p:extLst>
+      <p:ext uri="{BB962C8B-B14F-4D97-AF65-F5344CB8AC3E}">
+        <p14:creationId xmlns:p14="http://schemas.microsoft.com/office/powerpoint/2010/main" val="571416506"/>
+      </p:ext>
+    </p:extLst>
+  </p:cSld>
+  <p:clrMapOvr>
+    <a:masterClrMapping/>
+  </p:clrMapOvr>
+</p:sld>
+</file>
+
+<file path=ppt/slides/slide6.xml><?xml version="1.0" encoding="utf-8"?>
+<p:sld xmlns:a="http://schemas.openxmlformats.org/drawingml/2006/main" xmlns:r="http://schemas.openxmlformats.org/officeDocument/2006/relationships" xmlns:p="http://schemas.openxmlformats.org/presentationml/2006/main">
+  <p:cSld>
+    <p:spTree>
+      <p:nvGrpSpPr>
+        <p:cNvPr id="1" name=""/>
+        <p:cNvGrpSpPr/>
+        <p:nvPr/>
+      </p:nvGrpSpPr>
+      <p:grpSpPr>
+        <a:xfrm>
+          <a:off x="0" y="0"/>
+          <a:ext cx="0" cy="0"/>
+          <a:chOff x="0" y="0"/>
+          <a:chExt cx="0" cy="0"/>
+        </a:xfrm>
+      </p:grpSpPr>
+      <p:sp>
+        <p:nvSpPr>
+          <p:cNvPr id="2" name="Title 1">
+            <a:extLst>
+              <a:ext uri="{FF2B5EF4-FFF2-40B4-BE49-F238E27FC236}">
+                <a16:creationId xmlns:a16="http://schemas.microsoft.com/office/drawing/2014/main" id="{FD9A9C3A-DB75-428E-9A64-FD25FEEBA06C}"/>
+              </a:ext>
+            </a:extLst>
+          </p:cNvPr>
+          <p:cNvSpPr>
+            <a:spLocks noGrp="1"/>
+          </p:cNvSpPr>
+          <p:nvPr>
+            <p:ph type="title"/>
+          </p:nvPr>
+        </p:nvSpPr>
+        <p:spPr/>
+        <p:txBody>
+          <a:bodyPr/>
+          <a:lstStyle/>
+          <a:p>
+            <a:r>
+              <a:rPr lang="en-US" dirty="0"/>
+              <a:t>Django Setup</a:t>
+            </a:r>
+            <a:endParaRPr lang="en-CA" dirty="0"/>
+          </a:p>
+        </p:txBody>
+      </p:sp>
+      <p:sp>
+        <p:nvSpPr>
+          <p:cNvPr id="3" name="Content Placeholder 2">
+            <a:extLst>
+              <a:ext uri="{FF2B5EF4-FFF2-40B4-BE49-F238E27FC236}">
+                <a16:creationId xmlns:a16="http://schemas.microsoft.com/office/drawing/2014/main" id="{14BF44DC-23DE-4B14-8D8F-9CAB1DA77DB5}"/>
+              </a:ext>
+            </a:extLst>
+          </p:cNvPr>
+          <p:cNvSpPr>
+            <a:spLocks noGrp="1"/>
+          </p:cNvSpPr>
+          <p:nvPr>
+            <p:ph idx="1"/>
+          </p:nvPr>
+        </p:nvSpPr>
+        <p:spPr/>
+        <p:txBody>
+          <a:bodyPr/>
+          <a:lstStyle/>
+          <a:p>
+            <a:r>
+              <a:rPr lang="en-US" dirty="0"/>
+              <a:t>To setup Django, We’ll have to setup python virtual environment, add python packages, setup Django project and app, and enable app in Django settings.</a:t>
+            </a:r>
+          </a:p>
+          <a:p>
+            <a:pPr lvl="1"/>
+            <a:r>
+              <a:rPr lang="en-US" dirty="0"/>
+              <a:t>Python Virtual environment setup:</a:t>
+            </a:r>
+          </a:p>
+          <a:p>
+            <a:pPr lvl="2"/>
+            <a:r>
+              <a:rPr lang="en-US" dirty="0"/>
+              <a:t>Open git bash in project folder and run the vagrant. (</a:t>
+            </a:r>
+            <a:r>
+              <a:rPr lang="en-US" i="1" dirty="0">
+                <a:effectLst>
+                  <a:outerShdw blurRad="38100" dist="38100" dir="2700000" algn="tl">
+                    <a:srgbClr val="000000">
+                      <a:alpha val="43137"/>
+                    </a:srgbClr>
+                  </a:outerShdw>
+                </a:effectLst>
+              </a:rPr>
+              <a:t>vagrant </a:t>
+            </a:r>
+            <a:r>
+              <a:rPr lang="en-US" i="1" dirty="0" err="1">
+                <a:effectLst>
+                  <a:outerShdw blurRad="38100" dist="38100" dir="2700000" algn="tl">
+                    <a:srgbClr val="000000">
+                      <a:alpha val="43137"/>
+                    </a:srgbClr>
+                  </a:outerShdw>
+                </a:effectLst>
+              </a:rPr>
+              <a:t>ssh</a:t>
+            </a:r>
+            <a:r>
+              <a:rPr lang="en-US" dirty="0"/>
+              <a:t>)</a:t>
+            </a:r>
+          </a:p>
+          <a:p>
+            <a:pPr lvl="2"/>
+            <a:r>
+              <a:rPr lang="en-US" dirty="0"/>
+              <a:t>Go to the vagrant directory. (</a:t>
+            </a:r>
+            <a:r>
+              <a:rPr lang="en-US" i="1" dirty="0">
+                <a:effectLst>
+                  <a:outerShdw blurRad="38100" dist="38100" dir="2700000" algn="tl">
+                    <a:srgbClr val="000000">
+                      <a:alpha val="43137"/>
+                    </a:srgbClr>
+                  </a:outerShdw>
+                </a:effectLst>
+              </a:rPr>
+              <a:t>cd /vagrant</a:t>
+            </a:r>
+            <a:r>
+              <a:rPr lang="en-US" dirty="0"/>
+              <a:t>)</a:t>
+            </a:r>
+          </a:p>
+          <a:p>
+            <a:pPr lvl="3"/>
+            <a:r>
+              <a:rPr lang="en-US" dirty="0"/>
+              <a:t>To confirm that you’re synced with the local code, type ls command to see all the files on vagrant directory (server).</a:t>
+            </a:r>
+          </a:p>
+          <a:p>
+            <a:pPr lvl="2"/>
+            <a:r>
+              <a:rPr lang="en-US" dirty="0"/>
+              <a:t>Create python virtual environment (</a:t>
+            </a:r>
+            <a:r>
+              <a:rPr lang="en-US" i="1" dirty="0">
+                <a:effectLst>
+                  <a:outerShdw blurRad="38100" dist="38100" dir="2700000" algn="tl">
+                    <a:srgbClr val="000000">
+                      <a:alpha val="43137"/>
+                    </a:srgbClr>
+                  </a:outerShdw>
+                </a:effectLst>
+              </a:rPr>
+              <a:t>python –m </a:t>
+            </a:r>
+            <a:r>
+              <a:rPr lang="en-US" i="1" dirty="0" err="1">
+                <a:effectLst>
+                  <a:outerShdw blurRad="38100" dist="38100" dir="2700000" algn="tl">
+                    <a:srgbClr val="000000">
+                      <a:alpha val="43137"/>
+                    </a:srgbClr>
+                  </a:outerShdw>
+                </a:effectLst>
+              </a:rPr>
+              <a:t>venv</a:t>
+            </a:r>
+            <a:r>
+              <a:rPr lang="en-US" i="1" dirty="0">
+                <a:effectLst>
+                  <a:outerShdw blurRad="38100" dist="38100" dir="2700000" algn="tl">
+                    <a:srgbClr val="000000">
+                      <a:alpha val="43137"/>
+                    </a:srgbClr>
+                  </a:outerShdw>
+                </a:effectLst>
+              </a:rPr>
+              <a:t> ~/env</a:t>
+            </a:r>
+            <a:r>
+              <a:rPr lang="en-US" dirty="0"/>
+              <a:t>)</a:t>
+            </a:r>
+          </a:p>
+          <a:p>
+            <a:pPr lvl="3"/>
+            <a:r>
+              <a:rPr lang="en-US" dirty="0"/>
+              <a:t>It’ll create new file folder in vagrant’s home/env directory. ( we do not need this environment to be synced with our project.)</a:t>
+            </a:r>
+          </a:p>
+          <a:p>
+            <a:pPr lvl="3"/>
+            <a:r>
+              <a:rPr lang="en-US" b="1" dirty="0"/>
+              <a:t>Activate</a:t>
+            </a:r>
+            <a:r>
+              <a:rPr lang="en-US" dirty="0"/>
+              <a:t>: </a:t>
+            </a:r>
+            <a:r>
+              <a:rPr lang="en-US" i="1" dirty="0">
+                <a:effectLst>
+                  <a:outerShdw blurRad="38100" dist="38100" dir="2700000" algn="tl">
+                    <a:srgbClr val="000000">
+                      <a:alpha val="43137"/>
+                    </a:srgbClr>
+                  </a:outerShdw>
+                </a:effectLst>
+              </a:rPr>
+              <a:t>source ~/env/bin/activate</a:t>
+            </a:r>
+            <a:r>
+              <a:rPr lang="en-US" dirty="0"/>
+              <a:t> </a:t>
+            </a:r>
+            <a:r>
+              <a:rPr lang="en-US" b="1" dirty="0"/>
+              <a:t>Deactivate</a:t>
+            </a:r>
+            <a:r>
+              <a:rPr lang="en-US" dirty="0"/>
+              <a:t>: </a:t>
+            </a:r>
+            <a:r>
+              <a:rPr lang="en-US" i="1" dirty="0">
+                <a:effectLst>
+                  <a:outerShdw blurRad="38100" dist="38100" dir="2700000" algn="tl">
+                    <a:srgbClr val="000000">
+                      <a:alpha val="43137"/>
+                    </a:srgbClr>
+                  </a:outerShdw>
+                </a:effectLst>
+              </a:rPr>
+              <a:t>deactivate</a:t>
+            </a:r>
+          </a:p>
+          <a:p>
+            <a:endParaRPr lang="en-CA" dirty="0"/>
+          </a:p>
+        </p:txBody>
+      </p:sp>
+    </p:spTree>
+    <p:extLst>
+      <p:ext uri="{BB962C8B-B14F-4D97-AF65-F5344CB8AC3E}">
+        <p14:creationId xmlns:p14="http://schemas.microsoft.com/office/powerpoint/2010/main" val="4175306527"/>
+      </p:ext>
+    </p:extLst>
+  </p:cSld>
+  <p:clrMapOvr>
+    <a:masterClrMapping/>
+  </p:clrMapOvr>
+</p:sld>
+</file>
+
+<file path=ppt/slides/slide7.xml><?xml version="1.0" encoding="utf-8"?>
+<p:sld xmlns:a="http://schemas.openxmlformats.org/drawingml/2006/main" xmlns:r="http://schemas.openxmlformats.org/officeDocument/2006/relationships" xmlns:p="http://schemas.openxmlformats.org/presentationml/2006/main">
+  <p:cSld>
+    <p:spTree>
+      <p:nvGrpSpPr>
+        <p:cNvPr id="1" name=""/>
+        <p:cNvGrpSpPr/>
+        <p:nvPr/>
+      </p:nvGrpSpPr>
+      <p:grpSpPr>
+        <a:xfrm>
+          <a:off x="0" y="0"/>
+          <a:ext cx="0" cy="0"/>
+          <a:chOff x="0" y="0"/>
+          <a:chExt cx="0" cy="0"/>
+        </a:xfrm>
+      </p:grpSpPr>
+      <p:sp>
+        <p:nvSpPr>
+          <p:cNvPr id="2" name="Title 1">
+            <a:extLst>
+              <a:ext uri="{FF2B5EF4-FFF2-40B4-BE49-F238E27FC236}">
+                <a16:creationId xmlns:a16="http://schemas.microsoft.com/office/drawing/2014/main" id="{3D8217DF-A162-4835-B384-0087CEF68940}"/>
+              </a:ext>
+            </a:extLst>
+          </p:cNvPr>
+          <p:cNvSpPr>
+            <a:spLocks noGrp="1"/>
+          </p:cNvSpPr>
+          <p:nvPr>
+            <p:ph type="title"/>
+          </p:nvPr>
+        </p:nvSpPr>
+        <p:spPr/>
+        <p:txBody>
+          <a:bodyPr/>
+          <a:lstStyle/>
+          <a:p>
+            <a:r>
+              <a:rPr lang="en-CA" dirty="0"/>
+              <a:t>Cont.</a:t>
+            </a:r>
+          </a:p>
+        </p:txBody>
+      </p:sp>
+      <p:sp>
+        <p:nvSpPr>
+          <p:cNvPr id="3" name="Content Placeholder 2">
+            <a:extLst>
+              <a:ext uri="{FF2B5EF4-FFF2-40B4-BE49-F238E27FC236}">
+                <a16:creationId xmlns:a16="http://schemas.microsoft.com/office/drawing/2014/main" id="{3288E944-AE39-4636-8DC0-BAF1EB319D4A}"/>
+              </a:ext>
+            </a:extLst>
+          </p:cNvPr>
+          <p:cNvSpPr>
+            <a:spLocks noGrp="1"/>
+          </p:cNvSpPr>
+          <p:nvPr>
+            <p:ph idx="1"/>
+          </p:nvPr>
+        </p:nvSpPr>
+        <p:spPr/>
+        <p:txBody>
+          <a:bodyPr/>
+          <a:lstStyle/>
+          <a:p>
+            <a:r>
+              <a:rPr lang="en-CA" dirty="0"/>
+              <a:t>Once you’ll have the virtual environment setup, we’ll go ahead and install all the packages we’ll need to setup this project.</a:t>
+            </a:r>
+          </a:p>
+          <a:p>
+            <a:pPr lvl="1"/>
+            <a:r>
+              <a:rPr lang="en-CA" dirty="0"/>
+              <a:t>Python packages:</a:t>
+            </a:r>
+          </a:p>
+          <a:p>
+            <a:pPr lvl="2"/>
+            <a:r>
+              <a:rPr lang="en-CA" dirty="0" err="1"/>
+              <a:t>django</a:t>
+            </a:r>
+            <a:r>
+              <a:rPr lang="en-CA" dirty="0"/>
+              <a:t>==2.2</a:t>
+            </a:r>
+          </a:p>
+          <a:p>
+            <a:pPr lvl="2"/>
+            <a:r>
+              <a:rPr lang="en-CA" dirty="0" err="1"/>
+              <a:t>djangorestframework</a:t>
+            </a:r>
+            <a:r>
+              <a:rPr lang="en-CA" dirty="0"/>
+              <a:t>==3.9.2</a:t>
+            </a:r>
+          </a:p>
+          <a:p>
+            <a:pPr lvl="2"/>
+            <a:r>
+              <a:rPr lang="en-CA" dirty="0"/>
+              <a:t>Note: this are not latest packages, to know more, visit </a:t>
+            </a:r>
+            <a:r>
+              <a:rPr lang="en-CA" dirty="0">
+                <a:hlinkClick r:id="rId2"/>
+              </a:rPr>
+              <a:t>this</a:t>
+            </a:r>
+            <a:r>
+              <a:rPr lang="en-CA" dirty="0"/>
+              <a:t> website.</a:t>
+            </a:r>
+          </a:p>
+          <a:p>
+            <a:pPr lvl="2"/>
+            <a:r>
+              <a:rPr lang="en-CA" dirty="0"/>
+              <a:t>Installation: (make sure python virtual environment is activated)</a:t>
+            </a:r>
+          </a:p>
+          <a:p>
+            <a:pPr lvl="3"/>
+            <a:r>
+              <a:rPr lang="en-CA" dirty="0"/>
+              <a:t>There are 2 ways to install these packages.</a:t>
+            </a:r>
+          </a:p>
+          <a:p>
+            <a:pPr marL="1714500" lvl="3" indent="-342900">
+              <a:buAutoNum type="arabicParenR"/>
+            </a:pPr>
+            <a:r>
+              <a:rPr lang="en-CA" dirty="0"/>
+              <a:t>individually</a:t>
+            </a:r>
+            <a:r>
+              <a:rPr lang="en-CA" i="1" dirty="0">
+                <a:effectLst>
+                  <a:outerShdw blurRad="38100" dist="38100" dir="2700000" algn="tl">
+                    <a:srgbClr val="000000">
+                      <a:alpha val="43137"/>
+                    </a:srgbClr>
+                  </a:outerShdw>
+                </a:effectLst>
+              </a:rPr>
+              <a:t>, pip install &lt;module name&gt; == &lt;version&gt;</a:t>
+            </a:r>
+          </a:p>
+          <a:p>
+            <a:pPr marL="1714500" lvl="3" indent="-342900">
+              <a:buAutoNum type="arabicParenR"/>
+            </a:pPr>
+            <a:r>
+              <a:rPr lang="en-CA" dirty="0"/>
+              <a:t>All together, create requirements.txt and add all modules shown above. Then use the command </a:t>
+            </a:r>
+            <a:r>
+              <a:rPr lang="en-CA" i="1" dirty="0">
+                <a:effectLst>
+                  <a:outerShdw blurRad="38100" dist="38100" dir="2700000" algn="tl">
+                    <a:srgbClr val="000000">
+                      <a:alpha val="43137"/>
+                    </a:srgbClr>
+                  </a:outerShdw>
+                </a:effectLst>
+              </a:rPr>
+              <a:t>pip install –r requirements.txt</a:t>
+            </a:r>
+            <a:r>
+              <a:rPr lang="en-CA" dirty="0"/>
+              <a:t>. It’ll install all the modules specified in the requirements.txt file.</a:t>
+            </a:r>
+          </a:p>
+          <a:p>
+            <a:pPr lvl="2"/>
+            <a:endParaRPr lang="en-CA" dirty="0"/>
+          </a:p>
+        </p:txBody>
+      </p:sp>
+    </p:spTree>
+    <p:extLst>
+      <p:ext uri="{BB962C8B-B14F-4D97-AF65-F5344CB8AC3E}">
+        <p14:creationId xmlns:p14="http://schemas.microsoft.com/office/powerpoint/2010/main" val="3252466296"/>
+      </p:ext>
+    </p:extLst>
+  </p:cSld>
+  <p:clrMapOvr>
+    <a:masterClrMapping/>
+  </p:clrMapOvr>
+</p:sld>
+</file>
+
+<file path=ppt/slides/slide8.xml><?xml version="1.0" encoding="utf-8"?>
+<p:sld xmlns:a="http://schemas.openxmlformats.org/drawingml/2006/main" xmlns:r="http://schemas.openxmlformats.org/officeDocument/2006/relationships" xmlns:p="http://schemas.openxmlformats.org/presentationml/2006/main">
+  <p:cSld>
+    <p:spTree>
+      <p:nvGrpSpPr>
+        <p:cNvPr id="1" name=""/>
+        <p:cNvGrpSpPr/>
+        <p:nvPr/>
+      </p:nvGrpSpPr>
+      <p:grpSpPr>
+        <a:xfrm>
+          <a:off x="0" y="0"/>
+          <a:ext cx="0" cy="0"/>
+          <a:chOff x="0" y="0"/>
+          <a:chExt cx="0" cy="0"/>
+        </a:xfrm>
+      </p:grpSpPr>
+      <p:sp>
+        <p:nvSpPr>
+          <p:cNvPr id="2" name="Title 1">
+            <a:extLst>
+              <a:ext uri="{FF2B5EF4-FFF2-40B4-BE49-F238E27FC236}">
+                <a16:creationId xmlns:a16="http://schemas.microsoft.com/office/drawing/2014/main" id="{C40B06F7-0A67-4E34-9701-B897EFD0B836}"/>
+              </a:ext>
+            </a:extLst>
+          </p:cNvPr>
+          <p:cNvSpPr>
+            <a:spLocks noGrp="1"/>
+          </p:cNvSpPr>
+          <p:nvPr>
+            <p:ph type="title"/>
+          </p:nvPr>
+        </p:nvSpPr>
+        <p:spPr/>
+        <p:txBody>
+          <a:bodyPr/>
+          <a:lstStyle/>
+          <a:p>
+            <a:r>
+              <a:rPr lang="en-CA" dirty="0"/>
+              <a:t>Cont.</a:t>
+            </a:r>
+          </a:p>
+        </p:txBody>
+      </p:sp>
+      <p:sp>
+        <p:nvSpPr>
+          <p:cNvPr id="3" name="Content Placeholder 2">
+            <a:extLst>
+              <a:ext uri="{FF2B5EF4-FFF2-40B4-BE49-F238E27FC236}">
+                <a16:creationId xmlns:a16="http://schemas.microsoft.com/office/drawing/2014/main" id="{0B05F5AB-F889-4B65-AFB0-925F2D8FD1B1}"/>
+              </a:ext>
+            </a:extLst>
+          </p:cNvPr>
+          <p:cNvSpPr>
+            <a:spLocks noGrp="1"/>
+          </p:cNvSpPr>
+          <p:nvPr>
+            <p:ph idx="1"/>
+          </p:nvPr>
+        </p:nvSpPr>
+        <p:spPr/>
+        <p:txBody>
+          <a:bodyPr/>
+          <a:lstStyle/>
+          <a:p>
+            <a:r>
+              <a:rPr lang="en-CA" dirty="0"/>
+              <a:t>Now that we have full python pipeline installed. Let’s create Django project and app.</a:t>
+            </a:r>
+          </a:p>
+          <a:p>
+            <a:pPr lvl="1"/>
+            <a:r>
+              <a:rPr lang="en-CA" dirty="0"/>
+              <a:t>Setup the Django project:</a:t>
+            </a:r>
+          </a:p>
+          <a:p>
+            <a:pPr lvl="2"/>
+            <a:r>
+              <a:rPr lang="en-CA" dirty="0"/>
+              <a:t>Run this command: </a:t>
+            </a:r>
+            <a:r>
+              <a:rPr lang="en-CA" sz="1800" i="1" dirty="0">
+                <a:solidFill>
+                  <a:prstClr val="black"/>
+                </a:solidFill>
+                <a:effectLst>
+                  <a:outerShdw blurRad="38100" dist="38100" dir="2700000" algn="tl">
+                    <a:srgbClr val="000000">
+                      <a:alpha val="43137"/>
+                    </a:srgbClr>
+                  </a:outerShdw>
+                </a:effectLst>
+                <a:latin typeface="Lucida Console" panose="020B0609040504020204" pitchFamily="49" charset="0"/>
+              </a:rPr>
+              <a:t>django-admin.py </a:t>
+            </a:r>
+            <a:r>
+              <a:rPr lang="en-CA" sz="1800" i="1" dirty="0" err="1">
+                <a:solidFill>
+                  <a:prstClr val="black"/>
+                </a:solidFill>
+                <a:effectLst>
+                  <a:outerShdw blurRad="38100" dist="38100" dir="2700000" algn="tl">
+                    <a:srgbClr val="000000">
+                      <a:alpha val="43137"/>
+                    </a:srgbClr>
+                  </a:outerShdw>
+                </a:effectLst>
+                <a:latin typeface="Lucida Console" panose="020B0609040504020204" pitchFamily="49" charset="0"/>
+              </a:rPr>
+              <a:t>startproject</a:t>
+            </a:r>
+            <a:r>
+              <a:rPr lang="en-CA" sz="1800" i="1" dirty="0">
+                <a:solidFill>
+                  <a:prstClr val="black"/>
+                </a:solidFill>
+                <a:effectLst>
+                  <a:outerShdw blurRad="38100" dist="38100" dir="2700000" algn="tl">
+                    <a:srgbClr val="000000">
+                      <a:alpha val="43137"/>
+                    </a:srgbClr>
+                  </a:outerShdw>
+                </a:effectLst>
+                <a:latin typeface="Lucida Console" panose="020B0609040504020204" pitchFamily="49" charset="0"/>
+              </a:rPr>
+              <a:t> </a:t>
+            </a:r>
+            <a:r>
+              <a:rPr lang="en-CA" sz="1800" i="1" dirty="0" err="1">
+                <a:solidFill>
+                  <a:prstClr val="black"/>
+                </a:solidFill>
+                <a:effectLst>
+                  <a:outerShdw blurRad="38100" dist="38100" dir="2700000" algn="tl">
+                    <a:srgbClr val="000000">
+                      <a:alpha val="43137"/>
+                    </a:srgbClr>
+                  </a:outerShdw>
+                </a:effectLst>
+                <a:latin typeface="Lucida Console" panose="020B0609040504020204" pitchFamily="49" charset="0"/>
+              </a:rPr>
+              <a:t>profiles_project</a:t>
+            </a:r>
+            <a:r>
+              <a:rPr lang="en-CA" sz="1800" i="1" dirty="0">
+                <a:solidFill>
+                  <a:prstClr val="black"/>
+                </a:solidFill>
+                <a:effectLst>
+                  <a:outerShdw blurRad="38100" dist="38100" dir="2700000" algn="tl">
+                    <a:srgbClr val="000000">
+                      <a:alpha val="43137"/>
+                    </a:srgbClr>
+                  </a:outerShdw>
+                </a:effectLst>
+                <a:latin typeface="Lucida Console" panose="020B0609040504020204" pitchFamily="49" charset="0"/>
+              </a:rPr>
+              <a:t> .</a:t>
+            </a:r>
+            <a:endParaRPr lang="en-CA" sz="1800" dirty="0">
+              <a:solidFill>
+                <a:prstClr val="black"/>
+              </a:solidFill>
+              <a:latin typeface="Lucida Console" panose="020B0609040504020204" pitchFamily="49" charset="0"/>
+            </a:endParaRPr>
+          </a:p>
+          <a:p>
+            <a:pPr lvl="3"/>
+            <a:r>
+              <a:rPr lang="en-CA" dirty="0">
+                <a:solidFill>
+                  <a:prstClr val="black"/>
+                </a:solidFill>
+              </a:rPr>
+              <a:t>This script will create new project with the name: </a:t>
+            </a:r>
+            <a:r>
+              <a:rPr lang="en-CA" dirty="0" err="1">
+                <a:solidFill>
+                  <a:prstClr val="black"/>
+                </a:solidFill>
+              </a:rPr>
+              <a:t>profile_project</a:t>
+            </a:r>
+            <a:r>
+              <a:rPr lang="en-CA" dirty="0">
+                <a:solidFill>
+                  <a:prstClr val="black"/>
+                </a:solidFill>
+              </a:rPr>
+              <a:t>.</a:t>
+            </a:r>
+          </a:p>
+          <a:p>
+            <a:pPr lvl="1"/>
+            <a:r>
+              <a:rPr lang="en-CA" dirty="0">
+                <a:solidFill>
+                  <a:prstClr val="black"/>
+                </a:solidFill>
+              </a:rPr>
+              <a:t>Setup the Django App:</a:t>
+            </a:r>
+          </a:p>
+          <a:p>
+            <a:pPr lvl="2"/>
+            <a:r>
+              <a:rPr lang="en-CA" dirty="0">
+                <a:solidFill>
+                  <a:prstClr val="black"/>
+                </a:solidFill>
+              </a:rPr>
+              <a:t>The Django project consist of one or more apps to allow separation of the functionalities.</a:t>
+            </a:r>
+          </a:p>
+          <a:p>
+            <a:pPr lvl="2"/>
+            <a:r>
+              <a:rPr lang="en-CA" dirty="0">
+                <a:solidFill>
+                  <a:prstClr val="black"/>
+                </a:solidFill>
+              </a:rPr>
+              <a:t>Run the command: </a:t>
+            </a:r>
+            <a:r>
+              <a:rPr lang="en-CA" sz="1800" i="1" dirty="0">
+                <a:solidFill>
+                  <a:prstClr val="black"/>
+                </a:solidFill>
+                <a:effectLst>
+                  <a:outerShdw blurRad="38100" dist="38100" dir="2700000" algn="tl">
+                    <a:srgbClr val="000000">
+                      <a:alpha val="43137"/>
+                    </a:srgbClr>
+                  </a:outerShdw>
+                </a:effectLst>
+                <a:latin typeface="Lucida Console" panose="020B0609040504020204" pitchFamily="49" charset="0"/>
+              </a:rPr>
+              <a:t>python manage.py </a:t>
+            </a:r>
+            <a:r>
+              <a:rPr lang="en-CA" sz="1800" i="1" dirty="0" err="1">
+                <a:solidFill>
+                  <a:prstClr val="black"/>
+                </a:solidFill>
+                <a:effectLst>
+                  <a:outerShdw blurRad="38100" dist="38100" dir="2700000" algn="tl">
+                    <a:srgbClr val="000000">
+                      <a:alpha val="43137"/>
+                    </a:srgbClr>
+                  </a:outerShdw>
+                </a:effectLst>
+                <a:latin typeface="Lucida Console" panose="020B0609040504020204" pitchFamily="49" charset="0"/>
+              </a:rPr>
+              <a:t>startapp</a:t>
+            </a:r>
+            <a:r>
+              <a:rPr lang="en-CA" sz="1800" i="1" dirty="0">
+                <a:solidFill>
+                  <a:prstClr val="black"/>
+                </a:solidFill>
+                <a:effectLst>
+                  <a:outerShdw blurRad="38100" dist="38100" dir="2700000" algn="tl">
+                    <a:srgbClr val="000000">
+                      <a:alpha val="43137"/>
+                    </a:srgbClr>
+                  </a:outerShdw>
+                </a:effectLst>
+                <a:latin typeface="Lucida Console" panose="020B0609040504020204" pitchFamily="49" charset="0"/>
+              </a:rPr>
+              <a:t> </a:t>
+            </a:r>
+            <a:r>
+              <a:rPr lang="en-CA" sz="1800" i="1" dirty="0" err="1">
+                <a:solidFill>
+                  <a:prstClr val="black"/>
+                </a:solidFill>
+                <a:effectLst>
+                  <a:outerShdw blurRad="38100" dist="38100" dir="2700000" algn="tl">
+                    <a:srgbClr val="000000">
+                      <a:alpha val="43137"/>
+                    </a:srgbClr>
+                  </a:outerShdw>
+                </a:effectLst>
+                <a:latin typeface="Lucida Console" panose="020B0609040504020204" pitchFamily="49" charset="0"/>
+              </a:rPr>
+              <a:t>profile_api</a:t>
+            </a:r>
+            <a:endParaRPr lang="en-CA" sz="1800" dirty="0">
+              <a:solidFill>
+                <a:prstClr val="black"/>
+              </a:solidFill>
+              <a:latin typeface="Lucida Console" panose="020B0609040504020204" pitchFamily="49" charset="0"/>
+            </a:endParaRPr>
+          </a:p>
+          <a:p>
+            <a:pPr lvl="3"/>
+            <a:r>
+              <a:rPr lang="en-CA" dirty="0">
+                <a:solidFill>
+                  <a:prstClr val="black"/>
+                </a:solidFill>
+              </a:rPr>
+              <a:t>This script will create new folder </a:t>
+            </a:r>
+            <a:r>
+              <a:rPr lang="en-CA" dirty="0" err="1">
+                <a:solidFill>
+                  <a:prstClr val="black"/>
+                </a:solidFill>
+              </a:rPr>
+              <a:t>profile_api</a:t>
+            </a:r>
+            <a:r>
+              <a:rPr lang="en-CA" dirty="0">
+                <a:solidFill>
+                  <a:prstClr val="black"/>
+                </a:solidFill>
+              </a:rPr>
+              <a:t> as an application folder.</a:t>
+            </a:r>
+          </a:p>
+          <a:p>
+            <a:pPr lvl="3"/>
+            <a:endParaRPr lang="en-CA" dirty="0">
+              <a:solidFill>
+                <a:prstClr val="black"/>
+              </a:solidFill>
+            </a:endParaRPr>
+          </a:p>
+        </p:txBody>
+      </p:sp>
+    </p:spTree>
+    <p:extLst>
+      <p:ext uri="{BB962C8B-B14F-4D97-AF65-F5344CB8AC3E}">
+        <p14:creationId xmlns:p14="http://schemas.microsoft.com/office/powerpoint/2010/main" val="3049732987"/>
+      </p:ext>
+    </p:extLst>
+  </p:cSld>
+  <p:clrMapOvr>
+    <a:masterClrMapping/>
+  </p:clrMapOvr>
+</p:sld>
+</file>
+
+<file path=ppt/slides/slide9.xml><?xml version="1.0" encoding="utf-8"?>
+<p:sld xmlns:a="http://schemas.openxmlformats.org/drawingml/2006/main" xmlns:r="http://schemas.openxmlformats.org/officeDocument/2006/relationships" xmlns:p="http://schemas.openxmlformats.org/presentationml/2006/main">
+  <p:cSld>
+    <p:spTree>
+      <p:nvGrpSpPr>
+        <p:cNvPr id="1" name=""/>
+        <p:cNvGrpSpPr/>
+        <p:nvPr/>
+      </p:nvGrpSpPr>
+      <p:grpSpPr>
+        <a:xfrm>
+          <a:off x="0" y="0"/>
+          <a:ext cx="0" cy="0"/>
+          <a:chOff x="0" y="0"/>
+          <a:chExt cx="0" cy="0"/>
+        </a:xfrm>
+      </p:grpSpPr>
+      <p:sp>
+        <p:nvSpPr>
+          <p:cNvPr id="2" name="Title 1">
+            <a:extLst>
+              <a:ext uri="{FF2B5EF4-FFF2-40B4-BE49-F238E27FC236}">
+                <a16:creationId xmlns:a16="http://schemas.microsoft.com/office/drawing/2014/main" id="{CDB81DEB-677E-4FC7-A11B-A7412E9C2043}"/>
+              </a:ext>
+            </a:extLst>
+          </p:cNvPr>
+          <p:cNvSpPr>
+            <a:spLocks noGrp="1"/>
+          </p:cNvSpPr>
+          <p:nvPr>
+            <p:ph type="title"/>
+          </p:nvPr>
+        </p:nvSpPr>
+        <p:spPr/>
+        <p:txBody>
+          <a:bodyPr/>
+          <a:lstStyle/>
+          <a:p>
+            <a:r>
+              <a:rPr lang="en-CA" dirty="0"/>
+              <a:t>Cont.</a:t>
+            </a:r>
+          </a:p>
+        </p:txBody>
+      </p:sp>
+      <p:sp>
+        <p:nvSpPr>
+          <p:cNvPr id="3" name="Content Placeholder 2">
+            <a:extLst>
+              <a:ext uri="{FF2B5EF4-FFF2-40B4-BE49-F238E27FC236}">
+                <a16:creationId xmlns:a16="http://schemas.microsoft.com/office/drawing/2014/main" id="{C5E520D4-6C86-4188-9DB4-52A55D0154B7}"/>
+              </a:ext>
+            </a:extLst>
+          </p:cNvPr>
+          <p:cNvSpPr>
+            <a:spLocks noGrp="1"/>
+          </p:cNvSpPr>
+          <p:nvPr>
+            <p:ph idx="1"/>
+          </p:nvPr>
+        </p:nvSpPr>
+        <p:spPr/>
+        <p:txBody>
+          <a:bodyPr/>
+          <a:lstStyle/>
+          <a:p>
+            <a:r>
+              <a:rPr lang="en-CA" dirty="0"/>
+              <a:t>Remember, previously we installed rest framework using requirements.txt file? And in previous step we also created the Django project and app. Now it’s time to link those installs.</a:t>
+            </a:r>
+          </a:p>
+          <a:p>
+            <a:pPr lvl="1"/>
+            <a:r>
+              <a:rPr lang="en-CA" dirty="0"/>
+              <a:t>Django Project settings:</a:t>
+            </a:r>
+          </a:p>
+          <a:p>
+            <a:pPr lvl="2"/>
+            <a:r>
+              <a:rPr lang="en-CA" dirty="0"/>
+              <a:t>Go to settings.py from the project folder.</a:t>
+            </a:r>
+          </a:p>
+          <a:p>
+            <a:pPr lvl="2"/>
+            <a:r>
+              <a:rPr lang="en-CA" dirty="0"/>
+              <a:t>Navigate to the INSTALLED_APPS = [ … ]</a:t>
+            </a:r>
+          </a:p>
+          <a:p>
+            <a:pPr lvl="2"/>
+            <a:r>
+              <a:rPr lang="en-CA" dirty="0"/>
+              <a:t>Add these modules there:  [ …, '</a:t>
+            </a:r>
+            <a:r>
+              <a:rPr lang="en-CA" dirty="0" err="1"/>
+              <a:t>rest_framework</a:t>
+            </a:r>
+            <a:r>
+              <a:rPr lang="en-CA" dirty="0"/>
+              <a:t>',    '</a:t>
+            </a:r>
+            <a:r>
+              <a:rPr lang="en-CA" dirty="0" err="1"/>
+              <a:t>rest_framework.authtoken</a:t>
+            </a:r>
+            <a:r>
+              <a:rPr lang="en-CA" dirty="0"/>
+              <a:t>',    '</a:t>
+            </a:r>
+            <a:r>
+              <a:rPr lang="en-CA" dirty="0" err="1"/>
+              <a:t>profile_api</a:t>
+            </a:r>
+            <a:r>
+              <a:rPr lang="en-CA" dirty="0"/>
+              <a:t>’, ]</a:t>
+            </a:r>
+          </a:p>
+          <a:p>
+            <a:pPr lvl="2"/>
+            <a:r>
+              <a:rPr lang="en-CA" dirty="0"/>
+              <a:t>First 2 modules from the above mentioned step is related to rest framework. And last module is the Django app.</a:t>
+            </a:r>
+          </a:p>
+        </p:txBody>
+      </p:sp>
+    </p:spTree>
+    <p:extLst>
+      <p:ext uri="{BB962C8B-B14F-4D97-AF65-F5344CB8AC3E}">
+        <p14:creationId xmlns:p14="http://schemas.microsoft.com/office/powerpoint/2010/main" val="2223323377"/>
       </p:ext>
     </p:extLst>
   </p:cSld>

</xml_diff>

<commit_message>
Added custom user profile model manager and migration
</commit_message>
<xml_diff>
--- a/setup.pptx
+++ b/setup.pptx
@@ -15,6 +15,7 @@
     <p:sldId id="265" r:id="rId9"/>
     <p:sldId id="266" r:id="rId10"/>
     <p:sldId id="267" r:id="rId11"/>
+    <p:sldId id="268" r:id="rId12"/>
   </p:sldIdLst>
   <p:sldSz cx="12192000" cy="6858000"/>
   <p:notesSz cx="6858000" cy="9144000"/>
@@ -270,7 +271,7 @@
           <a:p>
             <a:fld id="{DBE5E07E-E33F-4296-ACDE-B7BF5645D92B}" type="datetimeFigureOut">
               <a:rPr lang="en-CA" smtClean="0"/>
-              <a:t>2021-12-23</a:t>
+              <a:t>2021-12-25</a:t>
             </a:fld>
             <a:endParaRPr lang="en-CA"/>
           </a:p>
@@ -470,7 +471,7 @@
           <a:p>
             <a:fld id="{DBE5E07E-E33F-4296-ACDE-B7BF5645D92B}" type="datetimeFigureOut">
               <a:rPr lang="en-CA" smtClean="0"/>
-              <a:t>2021-12-23</a:t>
+              <a:t>2021-12-25</a:t>
             </a:fld>
             <a:endParaRPr lang="en-CA"/>
           </a:p>
@@ -680,7 +681,7 @@
           <a:p>
             <a:fld id="{DBE5E07E-E33F-4296-ACDE-B7BF5645D92B}" type="datetimeFigureOut">
               <a:rPr lang="en-CA" smtClean="0"/>
-              <a:t>2021-12-23</a:t>
+              <a:t>2021-12-25</a:t>
             </a:fld>
             <a:endParaRPr lang="en-CA"/>
           </a:p>
@@ -880,7 +881,7 @@
           <a:p>
             <a:fld id="{DBE5E07E-E33F-4296-ACDE-B7BF5645D92B}" type="datetimeFigureOut">
               <a:rPr lang="en-CA" smtClean="0"/>
-              <a:t>2021-12-23</a:t>
+              <a:t>2021-12-25</a:t>
             </a:fld>
             <a:endParaRPr lang="en-CA"/>
           </a:p>
@@ -1156,7 +1157,7 @@
           <a:p>
             <a:fld id="{DBE5E07E-E33F-4296-ACDE-B7BF5645D92B}" type="datetimeFigureOut">
               <a:rPr lang="en-CA" smtClean="0"/>
-              <a:t>2021-12-23</a:t>
+              <a:t>2021-12-25</a:t>
             </a:fld>
             <a:endParaRPr lang="en-CA"/>
           </a:p>
@@ -1424,7 +1425,7 @@
           <a:p>
             <a:fld id="{DBE5E07E-E33F-4296-ACDE-B7BF5645D92B}" type="datetimeFigureOut">
               <a:rPr lang="en-CA" smtClean="0"/>
-              <a:t>2021-12-23</a:t>
+              <a:t>2021-12-25</a:t>
             </a:fld>
             <a:endParaRPr lang="en-CA"/>
           </a:p>
@@ -1839,7 +1840,7 @@
           <a:p>
             <a:fld id="{DBE5E07E-E33F-4296-ACDE-B7BF5645D92B}" type="datetimeFigureOut">
               <a:rPr lang="en-CA" smtClean="0"/>
-              <a:t>2021-12-23</a:t>
+              <a:t>2021-12-25</a:t>
             </a:fld>
             <a:endParaRPr lang="en-CA"/>
           </a:p>
@@ -1981,7 +1982,7 @@
           <a:p>
             <a:fld id="{DBE5E07E-E33F-4296-ACDE-B7BF5645D92B}" type="datetimeFigureOut">
               <a:rPr lang="en-CA" smtClean="0"/>
-              <a:t>2021-12-23</a:t>
+              <a:t>2021-12-25</a:t>
             </a:fld>
             <a:endParaRPr lang="en-CA"/>
           </a:p>
@@ -2094,7 +2095,7 @@
           <a:p>
             <a:fld id="{DBE5E07E-E33F-4296-ACDE-B7BF5645D92B}" type="datetimeFigureOut">
               <a:rPr lang="en-CA" smtClean="0"/>
-              <a:t>2021-12-23</a:t>
+              <a:t>2021-12-25</a:t>
             </a:fld>
             <a:endParaRPr lang="en-CA"/>
           </a:p>
@@ -2407,7 +2408,7 @@
           <a:p>
             <a:fld id="{DBE5E07E-E33F-4296-ACDE-B7BF5645D92B}" type="datetimeFigureOut">
               <a:rPr lang="en-CA" smtClean="0"/>
-              <a:t>2021-12-23</a:t>
+              <a:t>2021-12-25</a:t>
             </a:fld>
             <a:endParaRPr lang="en-CA"/>
           </a:p>
@@ -2696,7 +2697,7 @@
           <a:p>
             <a:fld id="{DBE5E07E-E33F-4296-ACDE-B7BF5645D92B}" type="datetimeFigureOut">
               <a:rPr lang="en-CA" smtClean="0"/>
-              <a:t>2021-12-23</a:t>
+              <a:t>2021-12-25</a:t>
             </a:fld>
             <a:endParaRPr lang="en-CA"/>
           </a:p>
@@ -2939,7 +2940,7 @@
           <a:p>
             <a:fld id="{DBE5E07E-E33F-4296-ACDE-B7BF5645D92B}" type="datetimeFigureOut">
               <a:rPr lang="en-CA" smtClean="0"/>
-              <a:t>2021-12-23</a:t>
+              <a:t>2021-12-25</a:t>
             </a:fld>
             <a:endParaRPr lang="en-CA"/>
           </a:p>
@@ -3426,6 +3427,14 @@
 <file path=ppt/slides/slide10.xml><?xml version="1.0" encoding="utf-8"?>
 <p:sld xmlns:a="http://schemas.openxmlformats.org/drawingml/2006/main" xmlns:r="http://schemas.openxmlformats.org/officeDocument/2006/relationships" xmlns:p="http://schemas.openxmlformats.org/presentationml/2006/main">
   <p:cSld>
+    <p:bg>
+      <p:bgPr>
+        <a:solidFill>
+          <a:schemeClr val="bg1"/>
+        </a:solidFill>
+        <a:effectLst/>
+      </p:bgPr>
+    </p:bg>
     <p:spTree>
       <p:nvGrpSpPr>
         <p:cNvPr id="1" name=""/>
@@ -3456,9 +3465,16 @@
             <p:ph type="title"/>
           </p:nvPr>
         </p:nvSpPr>
-        <p:spPr/>
-        <p:txBody>
-          <a:bodyPr/>
+        <p:spPr>
+          <a:xfrm>
+            <a:off x="648929" y="629266"/>
+            <a:ext cx="3505495" cy="1622321"/>
+          </a:xfrm>
+        </p:spPr>
+        <p:txBody>
+          <a:bodyPr>
+            <a:normAutofit/>
+          </a:bodyPr>
           <a:lstStyle/>
           <a:p>
             <a:r>
@@ -3484,21 +3500,404 @@
             <p:ph idx="1"/>
           </p:nvPr>
         </p:nvSpPr>
+        <p:spPr>
+          <a:xfrm>
+            <a:off x="648931" y="2438400"/>
+            <a:ext cx="3505494" cy="3785419"/>
+          </a:xfrm>
+        </p:spPr>
+        <p:txBody>
+          <a:bodyPr>
+            <a:normAutofit/>
+          </a:bodyPr>
+          <a:lstStyle/>
+          <a:p>
+            <a:r>
+              <a:rPr lang="en-CA" sz="1300" dirty="0"/>
+              <a:t>Finally You’ve completely setup your Django rest app project. Don’t believe it? Try this:</a:t>
+            </a:r>
+          </a:p>
+          <a:p>
+            <a:pPr lvl="1"/>
+            <a:r>
+              <a:rPr lang="en-CA" sz="1300" dirty="0"/>
+              <a:t>Run this script: </a:t>
+            </a:r>
+            <a:r>
+              <a:rPr lang="en-CA" sz="1300" i="1" dirty="0">
+                <a:effectLst>
+                  <a:outerShdw blurRad="38100" dist="38100" dir="2700000" algn="tl">
+                    <a:srgbClr val="000000">
+                      <a:alpha val="43137"/>
+                    </a:srgbClr>
+                  </a:outerShdw>
+                </a:effectLst>
+                <a:latin typeface="Lucida Console" panose="020B0609040504020204" pitchFamily="49" charset="0"/>
+              </a:rPr>
+              <a:t>python manage.py </a:t>
+            </a:r>
+            <a:r>
+              <a:rPr lang="en-CA" sz="1300" i="1" dirty="0" err="1">
+                <a:effectLst>
+                  <a:outerShdw blurRad="38100" dist="38100" dir="2700000" algn="tl">
+                    <a:srgbClr val="000000">
+                      <a:alpha val="43137"/>
+                    </a:srgbClr>
+                  </a:outerShdw>
+                </a:effectLst>
+                <a:latin typeface="Lucida Console" panose="020B0609040504020204" pitchFamily="49" charset="0"/>
+              </a:rPr>
+              <a:t>runserver</a:t>
+            </a:r>
+            <a:r>
+              <a:rPr lang="en-CA" sz="1300" i="1" dirty="0">
+                <a:effectLst>
+                  <a:outerShdw blurRad="38100" dist="38100" dir="2700000" algn="tl">
+                    <a:srgbClr val="000000">
+                      <a:alpha val="43137"/>
+                    </a:srgbClr>
+                  </a:outerShdw>
+                </a:effectLst>
+                <a:latin typeface="Lucida Console" panose="020B0609040504020204" pitchFamily="49" charset="0"/>
+              </a:rPr>
+              <a:t> 0.0.0.0:8000</a:t>
+            </a:r>
+            <a:endParaRPr lang="en-CA" sz="1300" dirty="0">
+              <a:latin typeface="Lucida Console" panose="020B0609040504020204" pitchFamily="49" charset="0"/>
+            </a:endParaRPr>
+          </a:p>
+          <a:p>
+            <a:pPr lvl="2"/>
+            <a:r>
+              <a:rPr lang="en-CA" sz="1300" dirty="0"/>
+              <a:t>Note: change the port number according to your own specified port. Go to the vagrant file and check which port are you using for the host and guest network.</a:t>
+            </a:r>
+          </a:p>
+          <a:p>
+            <a:pPr lvl="2"/>
+            <a:r>
+              <a:rPr lang="en-CA" sz="1300" dirty="0"/>
+              <a:t>Ignored the unapplied migrations. We’ll deal with that later.</a:t>
+            </a:r>
+          </a:p>
+          <a:p>
+            <a:pPr lvl="2"/>
+            <a:r>
+              <a:rPr lang="en-CA" sz="1300" dirty="0"/>
+              <a:t>Open the browser and search the url: localhost:8000</a:t>
+            </a:r>
+          </a:p>
+          <a:p>
+            <a:pPr lvl="2"/>
+            <a:r>
+              <a:rPr lang="en-CA" sz="1300" dirty="0"/>
+              <a:t>If you see something like this shown in the right side, </a:t>
+            </a:r>
+            <a:r>
+              <a:rPr lang="en-CA" sz="1300" dirty="0" err="1"/>
+              <a:t>yey</a:t>
+            </a:r>
+            <a:r>
+              <a:rPr lang="en-CA" sz="1300" dirty="0"/>
+              <a:t>! Everything worked as expected.</a:t>
+            </a:r>
+          </a:p>
+        </p:txBody>
+      </p:sp>
+      <p:sp>
+        <p:nvSpPr>
+          <p:cNvPr id="10" name="Rectangle 9">
+            <a:extLst>
+              <a:ext uri="{FF2B5EF4-FFF2-40B4-BE49-F238E27FC236}">
+                <a16:creationId xmlns:a16="http://schemas.microsoft.com/office/drawing/2014/main" id="{5E39A796-BE83-48B1-B33F-35C4A32AAB57}"/>
+              </a:ext>
+              <a:ext uri="{C183D7F6-B498-43B3-948B-1728B52AA6E4}">
+                <adec:decorative xmlns:adec="http://schemas.microsoft.com/office/drawing/2017/decorative" val="1"/>
+              </a:ext>
+            </a:extLst>
+          </p:cNvPr>
+          <p:cNvSpPr>
+            <a:spLocks noGrp="1" noRot="1" noChangeAspect="1" noMove="1" noResize="1" noEditPoints="1" noAdjustHandles="1" noChangeArrowheads="1" noChangeShapeType="1" noTextEdit="1"/>
+          </p:cNvSpPr>
+          <p:nvPr>
+            <p:extLst>
+              <p:ext uri="{386F3935-93C4-4BCD-93E2-E3B085C9AB24}">
+                <p16:designElem xmlns:p16="http://schemas.microsoft.com/office/powerpoint/2015/main" val="1"/>
+              </p:ext>
+            </p:extLst>
+          </p:nvPr>
+        </p:nvSpPr>
+        <p:spPr>
+          <a:xfrm>
+            <a:off x="4639056" y="0"/>
+            <a:ext cx="7552944" cy="6858000"/>
+          </a:xfrm>
+          <a:prstGeom prst="rect">
+            <a:avLst/>
+          </a:prstGeom>
+          <a:solidFill>
+            <a:srgbClr val="C8CACA"/>
+          </a:solidFill>
+          <a:ln>
+            <a:noFill/>
+          </a:ln>
+        </p:spPr>
+        <p:style>
+          <a:lnRef idx="2">
+            <a:schemeClr val="accent1">
+              <a:shade val="50000"/>
+            </a:schemeClr>
+          </a:lnRef>
+          <a:fillRef idx="1">
+            <a:schemeClr val="accent1"/>
+          </a:fillRef>
+          <a:effectRef idx="0">
+            <a:schemeClr val="accent1"/>
+          </a:effectRef>
+          <a:fontRef idx="minor">
+            <a:schemeClr val="lt1"/>
+          </a:fontRef>
+        </p:style>
+        <p:txBody>
+          <a:bodyPr rtlCol="0" anchor="ctr"/>
+          <a:lstStyle/>
+          <a:p>
+            <a:pPr algn="ctr"/>
+            <a:endParaRPr lang="en-US"/>
+          </a:p>
+        </p:txBody>
+      </p:sp>
+      <p:sp>
+        <p:nvSpPr>
+          <p:cNvPr id="12" name="Rounded Rectangle 9">
+            <a:extLst>
+              <a:ext uri="{FF2B5EF4-FFF2-40B4-BE49-F238E27FC236}">
+                <a16:creationId xmlns:a16="http://schemas.microsoft.com/office/drawing/2014/main" id="{72F84B47-E267-4194-8194-831DB7B5547F}"/>
+              </a:ext>
+              <a:ext uri="{C183D7F6-B498-43B3-948B-1728B52AA6E4}">
+                <adec:decorative xmlns:adec="http://schemas.microsoft.com/office/drawing/2017/decorative" val="1"/>
+              </a:ext>
+            </a:extLst>
+          </p:cNvPr>
+          <p:cNvSpPr>
+            <a:spLocks noGrp="1" noRot="1" noChangeAspect="1" noMove="1" noResize="1" noEditPoints="1" noAdjustHandles="1" noChangeArrowheads="1" noChangeShapeType="1" noTextEdit="1"/>
+          </p:cNvSpPr>
+          <p:nvPr>
+            <p:extLst>
+              <p:ext uri="{386F3935-93C4-4BCD-93E2-E3B085C9AB24}">
+                <p16:designElem xmlns:p16="http://schemas.microsoft.com/office/powerpoint/2015/main" val="1"/>
+              </p:ext>
+            </p:extLst>
+          </p:nvPr>
+        </p:nvSpPr>
+        <p:spPr>
+          <a:xfrm>
+            <a:off x="5123688" y="557784"/>
+            <a:ext cx="6584098" cy="5739187"/>
+          </a:xfrm>
+          <a:prstGeom prst="roundRect">
+            <a:avLst>
+              <a:gd name="adj" fmla="val 0"/>
+            </a:avLst>
+          </a:prstGeom>
+          <a:solidFill>
+            <a:srgbClr val="FFFFFF"/>
+          </a:solidFill>
+          <a:ln w="9525">
+            <a:solidFill>
+              <a:srgbClr val="C8CACA"/>
+            </a:solidFill>
+          </a:ln>
+          <a:effectLst>
+            <a:outerShdw blurRad="57150" dist="19050" dir="5400000" algn="t" rotWithShape="0">
+              <a:prstClr val="black">
+                <a:alpha val="63000"/>
+              </a:prstClr>
+            </a:outerShdw>
+          </a:effectLst>
+        </p:spPr>
+        <p:style>
+          <a:lnRef idx="2">
+            <a:schemeClr val="accent1">
+              <a:shade val="50000"/>
+            </a:schemeClr>
+          </a:lnRef>
+          <a:fillRef idx="1">
+            <a:schemeClr val="accent1"/>
+          </a:fillRef>
+          <a:effectRef idx="0">
+            <a:schemeClr val="accent1"/>
+          </a:effectRef>
+          <a:fontRef idx="minor">
+            <a:schemeClr val="lt1"/>
+          </a:fontRef>
+        </p:style>
+        <p:txBody>
+          <a:bodyPr rtlCol="0" anchor="ctr"/>
+          <a:lstStyle/>
+          <a:p>
+            <a:pPr algn="ctr"/>
+            <a:endParaRPr lang="en-US"/>
+          </a:p>
+        </p:txBody>
+      </p:sp>
+      <p:pic>
+        <p:nvPicPr>
+          <p:cNvPr id="5" name="Picture 4">
+            <a:extLst>
+              <a:ext uri="{FF2B5EF4-FFF2-40B4-BE49-F238E27FC236}">
+                <a16:creationId xmlns:a16="http://schemas.microsoft.com/office/drawing/2014/main" id="{A2FC490C-380E-4002-BB79-A0A79E95D096}"/>
+              </a:ext>
+            </a:extLst>
+          </p:cNvPr>
+          <p:cNvPicPr>
+            <a:picLocks noChangeAspect="1"/>
+          </p:cNvPicPr>
+          <p:nvPr/>
+        </p:nvPicPr>
+        <p:blipFill>
+          <a:blip r:embed="rId2"/>
+          <a:stretch>
+            <a:fillRect/>
+          </a:stretch>
+        </p:blipFill>
+        <p:spPr>
+          <a:xfrm>
+            <a:off x="5430019" y="807593"/>
+            <a:ext cx="5971017" cy="5239568"/>
+          </a:xfrm>
+          <a:prstGeom prst="rect">
+            <a:avLst/>
+          </a:prstGeom>
+          <a:effectLst/>
+        </p:spPr>
+      </p:pic>
+    </p:spTree>
+    <p:extLst>
+      <p:ext uri="{BB962C8B-B14F-4D97-AF65-F5344CB8AC3E}">
+        <p14:creationId xmlns:p14="http://schemas.microsoft.com/office/powerpoint/2010/main" val="3878923198"/>
+      </p:ext>
+    </p:extLst>
+  </p:cSld>
+  <p:clrMapOvr>
+    <a:masterClrMapping/>
+  </p:clrMapOvr>
+</p:sld>
+</file>
+
+<file path=ppt/slides/slide11.xml><?xml version="1.0" encoding="utf-8"?>
+<p:sld xmlns:a="http://schemas.openxmlformats.org/drawingml/2006/main" xmlns:r="http://schemas.openxmlformats.org/officeDocument/2006/relationships" xmlns:p="http://schemas.openxmlformats.org/presentationml/2006/main">
+  <p:cSld>
+    <p:spTree>
+      <p:nvGrpSpPr>
+        <p:cNvPr id="1" name=""/>
+        <p:cNvGrpSpPr/>
+        <p:nvPr/>
+      </p:nvGrpSpPr>
+      <p:grpSpPr>
+        <a:xfrm>
+          <a:off x="0" y="0"/>
+          <a:ext cx="0" cy="0"/>
+          <a:chOff x="0" y="0"/>
+          <a:chExt cx="0" cy="0"/>
+        </a:xfrm>
+      </p:grpSpPr>
+      <p:sp>
+        <p:nvSpPr>
+          <p:cNvPr id="2" name="Title 1">
+            <a:extLst>
+              <a:ext uri="{FF2B5EF4-FFF2-40B4-BE49-F238E27FC236}">
+                <a16:creationId xmlns:a16="http://schemas.microsoft.com/office/drawing/2014/main" id="{10B39426-66F0-4836-ABEE-FDC6D18987C5}"/>
+              </a:ext>
+            </a:extLst>
+          </p:cNvPr>
+          <p:cNvSpPr>
+            <a:spLocks noGrp="1"/>
+          </p:cNvSpPr>
+          <p:nvPr>
+            <p:ph type="title"/>
+          </p:nvPr>
+        </p:nvSpPr>
         <p:spPr/>
         <p:txBody>
           <a:bodyPr/>
           <a:lstStyle/>
           <a:p>
             <a:r>
+              <a:rPr lang="en-US" dirty="0"/>
+              <a:t>Database Setup</a:t>
+            </a:r>
+            <a:endParaRPr lang="en-CA" dirty="0"/>
+          </a:p>
+        </p:txBody>
+      </p:sp>
+      <p:sp>
+        <p:nvSpPr>
+          <p:cNvPr id="3" name="Content Placeholder 2">
+            <a:extLst>
+              <a:ext uri="{FF2B5EF4-FFF2-40B4-BE49-F238E27FC236}">
+                <a16:creationId xmlns:a16="http://schemas.microsoft.com/office/drawing/2014/main" id="{D80AE21E-3870-4525-B014-D0BFCE5D0BBD}"/>
+              </a:ext>
+            </a:extLst>
+          </p:cNvPr>
+          <p:cNvSpPr>
+            <a:spLocks noGrp="1"/>
+          </p:cNvSpPr>
+          <p:nvPr>
+            <p:ph idx="1"/>
+          </p:nvPr>
+        </p:nvSpPr>
+        <p:spPr/>
+        <p:txBody>
+          <a:bodyPr>
+            <a:normAutofit lnSpcReduction="10000"/>
+          </a:bodyPr>
+          <a:lstStyle/>
+          <a:p>
+            <a:r>
               <a:rPr lang="en-CA" dirty="0"/>
-              <a:t>Finally You’ve completely setup your Django rest app project. Don’t believe it? Try this:</a:t>
+              <a:t>To setup database, we’ll be using models &amp; managers</a:t>
             </a:r>
           </a:p>
           <a:p>
             <a:pPr lvl="1"/>
             <a:r>
               <a:rPr lang="en-CA" dirty="0"/>
-              <a:t>Run this script: </a:t>
+              <a:t>( Models &lt;=&gt; Managers &lt;=&gt; Databases)</a:t>
+            </a:r>
+          </a:p>
+          <a:p>
+            <a:r>
+              <a:rPr lang="en-CA" dirty="0"/>
+              <a:t>Customize models.py file available in Django app folder.</a:t>
+            </a:r>
+          </a:p>
+          <a:p>
+            <a:r>
+              <a:rPr lang="en-CA" dirty="0"/>
+              <a:t>Apply appropriate settings. (link models in the settings file of the Django project)</a:t>
+            </a:r>
+          </a:p>
+          <a:p>
+            <a:r>
+              <a:rPr lang="en-CA" dirty="0"/>
+              <a:t>Create Migration File. ( every time you change the model or add a new model, You’ll have to create a migration file. Migration file allow us to sync database tables to our custom Django models.</a:t>
+            </a:r>
+          </a:p>
+          <a:p>
+            <a:pPr lvl="1"/>
+            <a:r>
+              <a:rPr lang="en-CA" dirty="0"/>
+              <a:t>Use command line tool (git bash): </a:t>
+            </a:r>
+            <a:r>
+              <a:rPr lang="en-CA" sz="1800" dirty="0">
+                <a:solidFill>
+                  <a:prstClr val="black"/>
+                </a:solidFill>
+                <a:latin typeface="Lucida Console" panose="020B0609040504020204" pitchFamily="49" charset="0"/>
+              </a:rPr>
+              <a:t> </a:t>
             </a:r>
             <a:r>
               <a:rPr lang="en-CA" sz="1800" i="1" dirty="0">
@@ -3530,7 +3929,7 @@
                 </a:effectLst>
                 <a:latin typeface="Lucida Console" panose="020B0609040504020204" pitchFamily="49" charset="0"/>
               </a:rPr>
-              <a:t>runserver</a:t>
+              <a:t>makemigrations</a:t>
             </a:r>
             <a:r>
               <a:rPr lang="en-CA" sz="1800" i="1" dirty="0">
@@ -3546,12 +3945,35 @@
                 </a:effectLst>
                 <a:latin typeface="Lucida Console" panose="020B0609040504020204" pitchFamily="49" charset="0"/>
               </a:rPr>
-              <a:t> 0.0.0.0:8000</a:t>
-            </a:r>
-            <a:endParaRPr lang="en-CA" sz="1800" dirty="0">
+              <a:t> </a:t>
+            </a:r>
+            <a:r>
+              <a:rPr lang="en-CA" sz="1800" i="1" dirty="0" err="1">
+                <a:solidFill>
+                  <a:prstClr val="black"/>
+                </a:solidFill>
+                <a:effectLst>
+                  <a:outerShdw blurRad="38100" dist="38100" dir="2700000" algn="tl">
+                    <a:srgbClr val="000000">
+                      <a:alpha val="43137"/>
+                    </a:srgbClr>
+                  </a:outerShdw>
+                </a:effectLst>
+                <a:latin typeface="Lucida Console" panose="020B0609040504020204" pitchFamily="49" charset="0"/>
+              </a:rPr>
+              <a:t>profile_api</a:t>
+            </a:r>
+            <a:endParaRPr lang="en-CA" sz="1800" i="1" dirty="0">
               <a:solidFill>
                 <a:prstClr val="black"/>
               </a:solidFill>
+              <a:effectLst>
+                <a:outerShdw blurRad="38100" dist="38100" dir="2700000" algn="tl">
+                  <a:srgbClr val="000000">
+                    <a:alpha val="43137"/>
+                  </a:srgbClr>
+                </a:outerShdw>
+              </a:effectLst>
               <a:latin typeface="Lucida Console" panose="020B0609040504020204" pitchFamily="49" charset="0"/>
             </a:endParaRPr>
           </a:p>
@@ -3563,76 +3985,40 @@
                   <a:prstClr val="black"/>
                 </a:solidFill>
               </a:rPr>
-              <a:t>Note: change the port number according to your own specified port. Go to the vagrant file and check which port are you using for the host and guest network.</a:t>
-            </a:r>
-          </a:p>
-          <a:p>
-            <a:pPr lvl="2"/>
+              <a:t>Note: make sure you’re in the vagrant </a:t>
+            </a:r>
+            <a:r>
+              <a:rPr lang="en-CA" dirty="0" err="1">
+                <a:solidFill>
+                  <a:prstClr val="black"/>
+                </a:solidFill>
+              </a:rPr>
+              <a:t>ssh</a:t>
+            </a:r>
             <a:r>
               <a:rPr lang="en-CA" dirty="0">
                 <a:solidFill>
                   <a:prstClr val="black"/>
                 </a:solidFill>
               </a:rPr>
-              <a:t>Open the browser and search the url: localhost:8000</a:t>
-            </a:r>
-          </a:p>
-          <a:p>
-            <a:pPr lvl="2"/>
-            <a:r>
-              <a:rPr lang="en-CA" dirty="0"/>
-              <a:t>If you see something like these shown in the bottom right corner, </a:t>
-            </a:r>
-            <a:r>
-              <a:rPr lang="en-CA" dirty="0" err="1"/>
-              <a:t>yey</a:t>
-            </a:r>
-            <a:r>
-              <a:rPr lang="en-CA" dirty="0"/>
-              <a:t>! Everything worked </a:t>
-            </a:r>
-            <a:r>
-              <a:rPr lang="en-CA"/>
-              <a:t>as expected.</a:t>
+              <a:t> -&gt; in vagrant directory -&gt; activated python </a:t>
+            </a:r>
+            <a:r>
+              <a:rPr lang="en-CA" dirty="0" err="1">
+                <a:solidFill>
+                  <a:prstClr val="black"/>
+                </a:solidFill>
+              </a:rPr>
+              <a:t>venv</a:t>
             </a:r>
             <a:endParaRPr lang="en-CA" dirty="0"/>
           </a:p>
         </p:txBody>
       </p:sp>
-      <p:pic>
-        <p:nvPicPr>
-          <p:cNvPr id="5" name="Picture 4">
-            <a:extLst>
-              <a:ext uri="{FF2B5EF4-FFF2-40B4-BE49-F238E27FC236}">
-                <a16:creationId xmlns:a16="http://schemas.microsoft.com/office/drawing/2014/main" id="{A2FC490C-380E-4002-BB79-A0A79E95D096}"/>
-              </a:ext>
-            </a:extLst>
-          </p:cNvPr>
-          <p:cNvPicPr>
-            <a:picLocks noChangeAspect="1"/>
-          </p:cNvPicPr>
-          <p:nvPr/>
-        </p:nvPicPr>
-        <p:blipFill>
-          <a:blip r:embed="rId2"/>
-          <a:stretch>
-            <a:fillRect/>
-          </a:stretch>
-        </p:blipFill>
-        <p:spPr>
-          <a:xfrm>
-            <a:off x="9272589" y="4296855"/>
-            <a:ext cx="2919412" cy="2561145"/>
-          </a:xfrm>
-          <a:prstGeom prst="rect">
-            <a:avLst/>
-          </a:prstGeom>
-        </p:spPr>
-      </p:pic>
     </p:spTree>
     <p:extLst>
       <p:ext uri="{BB962C8B-B14F-4D97-AF65-F5344CB8AC3E}">
-        <p14:creationId xmlns:p14="http://schemas.microsoft.com/office/powerpoint/2010/main" val="3878923198"/>
+        <p14:creationId xmlns:p14="http://schemas.microsoft.com/office/powerpoint/2010/main" val="4146501446"/>
       </p:ext>
     </p:extLst>
   </p:cSld>

</xml_diff>

<commit_message>
Enabled Django admin for user profile model
</commit_message>
<xml_diff>
--- a/setup.pptx
+++ b/setup.pptx
@@ -16,6 +16,7 @@
     <p:sldId id="266" r:id="rId10"/>
     <p:sldId id="267" r:id="rId11"/>
     <p:sldId id="268" r:id="rId12"/>
+    <p:sldId id="269" r:id="rId13"/>
   </p:sldIdLst>
   <p:sldSz cx="12192000" cy="6858000"/>
   <p:notesSz cx="6858000" cy="9144000"/>
@@ -3850,7 +3851,7 @@
         <p:spPr/>
         <p:txBody>
           <a:bodyPr>
-            <a:normAutofit lnSpcReduction="10000"/>
+            <a:normAutofit fontScale="92500" lnSpcReduction="10000"/>
           </a:bodyPr>
           <a:lstStyle/>
           <a:p>
@@ -3885,7 +3886,10 @@
             </a:r>
           </a:p>
           <a:p>
-            <a:pPr lvl="1"/>
+            <a:pPr marL="914400" lvl="1" indent="-457200">
+              <a:buFont typeface="+mj-lt"/>
+              <a:buAutoNum type="arabicPeriod"/>
+            </a:pPr>
             <a:r>
               <a:rPr lang="en-CA" dirty="0"/>
               <a:t>Use command line tool (git bash): </a:t>
@@ -4011,6 +4015,44 @@
               </a:rPr>
               <a:t>venv</a:t>
             </a:r>
+            <a:endParaRPr lang="en-CA" dirty="0">
+              <a:solidFill>
+                <a:prstClr val="black"/>
+              </a:solidFill>
+            </a:endParaRPr>
+          </a:p>
+          <a:p>
+            <a:pPr marL="914400" lvl="1" indent="-457200">
+              <a:buFont typeface="+mj-lt"/>
+              <a:buAutoNum type="arabicPeriod"/>
+            </a:pPr>
+            <a:r>
+              <a:rPr lang="en-CA" dirty="0">
+                <a:solidFill>
+                  <a:prstClr val="black"/>
+                </a:solidFill>
+              </a:rPr>
+              <a:t>To Apply migrate for all models: </a:t>
+            </a:r>
+            <a:r>
+              <a:rPr lang="en-CA" sz="1800" i="1" dirty="0">
+                <a:solidFill>
+                  <a:prstClr val="black"/>
+                </a:solidFill>
+                <a:effectLst>
+                  <a:outerShdw blurRad="38100" dist="38100" dir="2700000" algn="tl">
+                    <a:srgbClr val="000000">
+                      <a:alpha val="43137"/>
+                    </a:srgbClr>
+                  </a:outerShdw>
+                </a:effectLst>
+                <a:latin typeface="Lucida Console" panose="020B0609040504020204" pitchFamily="49" charset="0"/>
+              </a:rPr>
+              <a:t>python manage.py migrate</a:t>
+            </a:r>
+          </a:p>
+          <a:p>
+            <a:pPr lvl="1"/>
             <a:endParaRPr lang="en-CA" dirty="0"/>
           </a:p>
         </p:txBody>
@@ -4019,6 +4061,221 @@
     <p:extLst>
       <p:ext uri="{BB962C8B-B14F-4D97-AF65-F5344CB8AC3E}">
         <p14:creationId xmlns:p14="http://schemas.microsoft.com/office/powerpoint/2010/main" val="4146501446"/>
+      </p:ext>
+    </p:extLst>
+  </p:cSld>
+  <p:clrMapOvr>
+    <a:masterClrMapping/>
+  </p:clrMapOvr>
+</p:sld>
+</file>
+
+<file path=ppt/slides/slide12.xml><?xml version="1.0" encoding="utf-8"?>
+<p:sld xmlns:a="http://schemas.openxmlformats.org/drawingml/2006/main" xmlns:r="http://schemas.openxmlformats.org/officeDocument/2006/relationships" xmlns:p="http://schemas.openxmlformats.org/presentationml/2006/main">
+  <p:cSld>
+    <p:spTree>
+      <p:nvGrpSpPr>
+        <p:cNvPr id="1" name=""/>
+        <p:cNvGrpSpPr/>
+        <p:nvPr/>
+      </p:nvGrpSpPr>
+      <p:grpSpPr>
+        <a:xfrm>
+          <a:off x="0" y="0"/>
+          <a:ext cx="0" cy="0"/>
+          <a:chOff x="0" y="0"/>
+          <a:chExt cx="0" cy="0"/>
+        </a:xfrm>
+      </p:grpSpPr>
+      <p:sp>
+        <p:nvSpPr>
+          <p:cNvPr id="2" name="Title 1">
+            <a:extLst>
+              <a:ext uri="{FF2B5EF4-FFF2-40B4-BE49-F238E27FC236}">
+                <a16:creationId xmlns:a16="http://schemas.microsoft.com/office/drawing/2014/main" id="{5692DBB9-8C12-4056-A0D2-69F3C4035B3C}"/>
+              </a:ext>
+            </a:extLst>
+          </p:cNvPr>
+          <p:cNvSpPr>
+            <a:spLocks noGrp="1"/>
+          </p:cNvSpPr>
+          <p:nvPr>
+            <p:ph type="title"/>
+          </p:nvPr>
+        </p:nvSpPr>
+        <p:spPr/>
+        <p:txBody>
+          <a:bodyPr/>
+          <a:lstStyle/>
+          <a:p>
+            <a:r>
+              <a:rPr lang="en-CA" dirty="0"/>
+              <a:t>Admin Setup &lt;superuser&gt;</a:t>
+            </a:r>
+          </a:p>
+        </p:txBody>
+      </p:sp>
+      <p:sp>
+        <p:nvSpPr>
+          <p:cNvPr id="3" name="Content Placeholder 2">
+            <a:extLst>
+              <a:ext uri="{FF2B5EF4-FFF2-40B4-BE49-F238E27FC236}">
+                <a16:creationId xmlns:a16="http://schemas.microsoft.com/office/drawing/2014/main" id="{DDD28F71-55A6-4095-8F77-9BB19670B788}"/>
+              </a:ext>
+            </a:extLst>
+          </p:cNvPr>
+          <p:cNvSpPr>
+            <a:spLocks noGrp="1"/>
+          </p:cNvSpPr>
+          <p:nvPr>
+            <p:ph idx="1"/>
+          </p:nvPr>
+        </p:nvSpPr>
+        <p:spPr/>
+        <p:txBody>
+          <a:bodyPr>
+            <a:normAutofit lnSpcReduction="10000"/>
+          </a:bodyPr>
+          <a:lstStyle/>
+          <a:p>
+            <a:r>
+              <a:rPr lang="en-CA" dirty="0"/>
+              <a:t>Django admin feature allow admin privileges to the user. This means admin user can inspect the databases, see models and can modifies them.</a:t>
+            </a:r>
+          </a:p>
+          <a:p>
+            <a:pPr lvl="1"/>
+            <a:r>
+              <a:rPr lang="en-CA" dirty="0"/>
+              <a:t>Pre-requirement: superuser (user with a max privileges)</a:t>
+            </a:r>
+          </a:p>
+          <a:p>
+            <a:pPr lvl="2"/>
+            <a:r>
+              <a:rPr lang="en-CA" dirty="0"/>
+              <a:t>To create superuser, script this: python manage.py </a:t>
+            </a:r>
+            <a:r>
+              <a:rPr lang="en-CA" dirty="0" err="1"/>
+              <a:t>createsuperuser</a:t>
+            </a:r>
+            <a:endParaRPr lang="en-CA" dirty="0"/>
+          </a:p>
+          <a:p>
+            <a:pPr lvl="1"/>
+            <a:r>
+              <a:rPr lang="en-CA" dirty="0"/>
+              <a:t>Enable Django admin for the model.</a:t>
+            </a:r>
+          </a:p>
+          <a:p>
+            <a:pPr lvl="2"/>
+            <a:r>
+              <a:rPr lang="en-CA" dirty="0"/>
+              <a:t>Open the admin.py file (from the Django app </a:t>
+            </a:r>
+            <a:r>
+              <a:rPr lang="en-CA" dirty="0" err="1"/>
+              <a:t>dir</a:t>
+            </a:r>
+            <a:r>
+              <a:rPr lang="en-CA" dirty="0"/>
+              <a:t>), and register the model.</a:t>
+            </a:r>
+          </a:p>
+          <a:p>
+            <a:pPr marL="1371600" lvl="3" indent="0">
+              <a:buNone/>
+            </a:pPr>
+            <a:r>
+              <a:rPr lang="en-CA" dirty="0"/>
+              <a:t>from </a:t>
+            </a:r>
+            <a:r>
+              <a:rPr lang="en-CA" dirty="0" err="1"/>
+              <a:t>profile_api</a:t>
+            </a:r>
+            <a:r>
+              <a:rPr lang="en-CA" dirty="0"/>
+              <a:t> import models</a:t>
+            </a:r>
+          </a:p>
+          <a:p>
+            <a:pPr marL="1371600" lvl="3" indent="0">
+              <a:buNone/>
+            </a:pPr>
+            <a:r>
+              <a:rPr lang="en-CA" dirty="0" err="1"/>
+              <a:t>admin.site.register</a:t>
+            </a:r>
+            <a:r>
+              <a:rPr lang="en-CA" dirty="0"/>
+              <a:t>(</a:t>
+            </a:r>
+            <a:r>
+              <a:rPr lang="en-CA" dirty="0" err="1"/>
+              <a:t>models,UserProfile</a:t>
+            </a:r>
+            <a:r>
+              <a:rPr lang="en-CA" dirty="0"/>
+              <a:t>)</a:t>
+            </a:r>
+          </a:p>
+          <a:p>
+            <a:pPr lvl="1"/>
+            <a:r>
+              <a:rPr lang="en-CA" dirty="0"/>
+              <a:t>Confirm changes</a:t>
+            </a:r>
+          </a:p>
+          <a:p>
+            <a:pPr lvl="2"/>
+            <a:r>
+              <a:rPr lang="en-CA" dirty="0"/>
+              <a:t>Open up the terminal: </a:t>
+            </a:r>
+            <a:r>
+              <a:rPr lang="en-CA" sz="1800" dirty="0">
+                <a:solidFill>
+                  <a:prstClr val="black"/>
+                </a:solidFill>
+                <a:latin typeface="Lucida Console" panose="020B0609040504020204" pitchFamily="49" charset="0"/>
+              </a:rPr>
+              <a:t> python manage.py </a:t>
+            </a:r>
+            <a:r>
+              <a:rPr lang="en-CA" sz="1800" dirty="0" err="1">
+                <a:solidFill>
+                  <a:prstClr val="black"/>
+                </a:solidFill>
+                <a:latin typeface="Lucida Console" panose="020B0609040504020204" pitchFamily="49" charset="0"/>
+              </a:rPr>
+              <a:t>runserver</a:t>
+            </a:r>
+            <a:r>
+              <a:rPr lang="en-CA" sz="1800" dirty="0">
+                <a:solidFill>
+                  <a:prstClr val="black"/>
+                </a:solidFill>
+                <a:latin typeface="Lucida Console" panose="020B0609040504020204" pitchFamily="49" charset="0"/>
+              </a:rPr>
+              <a:t> 0.0.0.0:8000</a:t>
+            </a:r>
+          </a:p>
+          <a:p>
+            <a:pPr lvl="2"/>
+            <a:r>
+              <a:rPr lang="en-CA" dirty="0"/>
+              <a:t>Browser: localhost:8000/admin</a:t>
+            </a:r>
+          </a:p>
+        </p:txBody>
+      </p:sp>
+    </p:spTree>
+    <p:extLst>
+      <p:ext uri="{BB962C8B-B14F-4D97-AF65-F5344CB8AC3E}">
+        <p14:creationId xmlns:p14="http://schemas.microsoft.com/office/powerpoint/2010/main" val="3122183456"/>
       </p:ext>
     </p:extLst>
   </p:cSld>

</xml_diff>

<commit_message>
added hello api view
</commit_message>
<xml_diff>
--- a/setup.pptx
+++ b/setup.pptx
@@ -17,6 +17,8 @@
     <p:sldId id="267" r:id="rId11"/>
     <p:sldId id="268" r:id="rId12"/>
     <p:sldId id="269" r:id="rId13"/>
+    <p:sldId id="270" r:id="rId14"/>
+    <p:sldId id="271" r:id="rId15"/>
   </p:sldIdLst>
   <p:sldSz cx="12192000" cy="6858000"/>
   <p:notesSz cx="6858000" cy="9144000"/>
@@ -272,7 +274,7 @@
           <a:p>
             <a:fld id="{DBE5E07E-E33F-4296-ACDE-B7BF5645D92B}" type="datetimeFigureOut">
               <a:rPr lang="en-CA" smtClean="0"/>
-              <a:t>2021-12-25</a:t>
+              <a:t>2021-12-29</a:t>
             </a:fld>
             <a:endParaRPr lang="en-CA"/>
           </a:p>
@@ -472,7 +474,7 @@
           <a:p>
             <a:fld id="{DBE5E07E-E33F-4296-ACDE-B7BF5645D92B}" type="datetimeFigureOut">
               <a:rPr lang="en-CA" smtClean="0"/>
-              <a:t>2021-12-25</a:t>
+              <a:t>2021-12-29</a:t>
             </a:fld>
             <a:endParaRPr lang="en-CA"/>
           </a:p>
@@ -682,7 +684,7 @@
           <a:p>
             <a:fld id="{DBE5E07E-E33F-4296-ACDE-B7BF5645D92B}" type="datetimeFigureOut">
               <a:rPr lang="en-CA" smtClean="0"/>
-              <a:t>2021-12-25</a:t>
+              <a:t>2021-12-29</a:t>
             </a:fld>
             <a:endParaRPr lang="en-CA"/>
           </a:p>
@@ -882,7 +884,7 @@
           <a:p>
             <a:fld id="{DBE5E07E-E33F-4296-ACDE-B7BF5645D92B}" type="datetimeFigureOut">
               <a:rPr lang="en-CA" smtClean="0"/>
-              <a:t>2021-12-25</a:t>
+              <a:t>2021-12-29</a:t>
             </a:fld>
             <a:endParaRPr lang="en-CA"/>
           </a:p>
@@ -1158,7 +1160,7 @@
           <a:p>
             <a:fld id="{DBE5E07E-E33F-4296-ACDE-B7BF5645D92B}" type="datetimeFigureOut">
               <a:rPr lang="en-CA" smtClean="0"/>
-              <a:t>2021-12-25</a:t>
+              <a:t>2021-12-29</a:t>
             </a:fld>
             <a:endParaRPr lang="en-CA"/>
           </a:p>
@@ -1426,7 +1428,7 @@
           <a:p>
             <a:fld id="{DBE5E07E-E33F-4296-ACDE-B7BF5645D92B}" type="datetimeFigureOut">
               <a:rPr lang="en-CA" smtClean="0"/>
-              <a:t>2021-12-25</a:t>
+              <a:t>2021-12-29</a:t>
             </a:fld>
             <a:endParaRPr lang="en-CA"/>
           </a:p>
@@ -1841,7 +1843,7 @@
           <a:p>
             <a:fld id="{DBE5E07E-E33F-4296-ACDE-B7BF5645D92B}" type="datetimeFigureOut">
               <a:rPr lang="en-CA" smtClean="0"/>
-              <a:t>2021-12-25</a:t>
+              <a:t>2021-12-29</a:t>
             </a:fld>
             <a:endParaRPr lang="en-CA"/>
           </a:p>
@@ -1983,7 +1985,7 @@
           <a:p>
             <a:fld id="{DBE5E07E-E33F-4296-ACDE-B7BF5645D92B}" type="datetimeFigureOut">
               <a:rPr lang="en-CA" smtClean="0"/>
-              <a:t>2021-12-25</a:t>
+              <a:t>2021-12-29</a:t>
             </a:fld>
             <a:endParaRPr lang="en-CA"/>
           </a:p>
@@ -2096,7 +2098,7 @@
           <a:p>
             <a:fld id="{DBE5E07E-E33F-4296-ACDE-B7BF5645D92B}" type="datetimeFigureOut">
               <a:rPr lang="en-CA" smtClean="0"/>
-              <a:t>2021-12-25</a:t>
+              <a:t>2021-12-29</a:t>
             </a:fld>
             <a:endParaRPr lang="en-CA"/>
           </a:p>
@@ -2409,7 +2411,7 @@
           <a:p>
             <a:fld id="{DBE5E07E-E33F-4296-ACDE-B7BF5645D92B}" type="datetimeFigureOut">
               <a:rPr lang="en-CA" smtClean="0"/>
-              <a:t>2021-12-25</a:t>
+              <a:t>2021-12-29</a:t>
             </a:fld>
             <a:endParaRPr lang="en-CA"/>
           </a:p>
@@ -2698,7 +2700,7 @@
           <a:p>
             <a:fld id="{DBE5E07E-E33F-4296-ACDE-B7BF5645D92B}" type="datetimeFigureOut">
               <a:rPr lang="en-CA" smtClean="0"/>
-              <a:t>2021-12-25</a:t>
+              <a:t>2021-12-29</a:t>
             </a:fld>
             <a:endParaRPr lang="en-CA"/>
           </a:p>
@@ -2941,7 +2943,7 @@
           <a:p>
             <a:fld id="{DBE5E07E-E33F-4296-ACDE-B7BF5645D92B}" type="datetimeFigureOut">
               <a:rPr lang="en-CA" smtClean="0"/>
-              <a:t>2021-12-25</a:t>
+              <a:t>2021-12-29</a:t>
             </a:fld>
             <a:endParaRPr lang="en-CA"/>
           </a:p>
@@ -4285,6 +4287,355 @@
 </p:sld>
 </file>
 
+<file path=ppt/slides/slide13.xml><?xml version="1.0" encoding="utf-8"?>
+<p:sld xmlns:a="http://schemas.openxmlformats.org/drawingml/2006/main" xmlns:r="http://schemas.openxmlformats.org/officeDocument/2006/relationships" xmlns:p="http://schemas.openxmlformats.org/presentationml/2006/main">
+  <p:cSld>
+    <p:spTree>
+      <p:nvGrpSpPr>
+        <p:cNvPr id="1" name=""/>
+        <p:cNvGrpSpPr/>
+        <p:nvPr/>
+      </p:nvGrpSpPr>
+      <p:grpSpPr>
+        <a:xfrm>
+          <a:off x="0" y="0"/>
+          <a:ext cx="0" cy="0"/>
+          <a:chOff x="0" y="0"/>
+          <a:chExt cx="0" cy="0"/>
+        </a:xfrm>
+      </p:grpSpPr>
+      <p:sp>
+        <p:nvSpPr>
+          <p:cNvPr id="2" name="Title 1">
+            <a:extLst>
+              <a:ext uri="{FF2B5EF4-FFF2-40B4-BE49-F238E27FC236}">
+                <a16:creationId xmlns:a16="http://schemas.microsoft.com/office/drawing/2014/main" id="{BC66FB93-794F-474E-AC1E-F381E137AF1D}"/>
+              </a:ext>
+            </a:extLst>
+          </p:cNvPr>
+          <p:cNvSpPr>
+            <a:spLocks noGrp="1"/>
+          </p:cNvSpPr>
+          <p:nvPr>
+            <p:ph type="title"/>
+          </p:nvPr>
+        </p:nvSpPr>
+        <p:spPr/>
+        <p:txBody>
+          <a:bodyPr/>
+          <a:lstStyle/>
+          <a:p>
+            <a:r>
+              <a:rPr lang="en-CA" dirty="0"/>
+              <a:t>Django REST Framework Views</a:t>
+            </a:r>
+          </a:p>
+        </p:txBody>
+      </p:sp>
+      <p:sp>
+        <p:nvSpPr>
+          <p:cNvPr id="3" name="Content Placeholder 2">
+            <a:extLst>
+              <a:ext uri="{FF2B5EF4-FFF2-40B4-BE49-F238E27FC236}">
+                <a16:creationId xmlns:a16="http://schemas.microsoft.com/office/drawing/2014/main" id="{F706FDD1-853F-4AF3-A6F9-93E4E896E93A}"/>
+              </a:ext>
+            </a:extLst>
+          </p:cNvPr>
+          <p:cNvSpPr>
+            <a:spLocks noGrp="1"/>
+          </p:cNvSpPr>
+          <p:nvPr>
+            <p:ph idx="1"/>
+          </p:nvPr>
+        </p:nvSpPr>
+        <p:spPr/>
+        <p:txBody>
+          <a:bodyPr/>
+          <a:lstStyle/>
+          <a:p>
+            <a:r>
+              <a:rPr lang="en-CA" dirty="0"/>
+              <a:t>2 ways to create an API. (</a:t>
+            </a:r>
+            <a:r>
+              <a:rPr lang="en-CA" dirty="0" err="1"/>
+              <a:t>APIView</a:t>
+            </a:r>
+            <a:r>
+              <a:rPr lang="en-CA" dirty="0"/>
+              <a:t> and a </a:t>
+            </a:r>
+            <a:r>
+              <a:rPr lang="en-CA" dirty="0" err="1"/>
+              <a:t>ViewSet</a:t>
+            </a:r>
+            <a:r>
+              <a:rPr lang="en-CA" dirty="0"/>
+              <a:t>)</a:t>
+            </a:r>
+          </a:p>
+          <a:p>
+            <a:endParaRPr lang="en-CA" dirty="0"/>
+          </a:p>
+          <a:p>
+            <a:pPr marL="914400" lvl="1" indent="-457200">
+              <a:buFont typeface="+mj-lt"/>
+              <a:buAutoNum type="arabicPeriod"/>
+            </a:pPr>
+            <a:r>
+              <a:rPr lang="en-CA" dirty="0" err="1"/>
+              <a:t>APIView</a:t>
+            </a:r>
+            <a:endParaRPr lang="en-CA" dirty="0"/>
+          </a:p>
+          <a:p>
+            <a:pPr lvl="2"/>
+            <a:r>
+              <a:rPr lang="en-CA" dirty="0"/>
+              <a:t>Most basic</a:t>
+            </a:r>
+          </a:p>
+          <a:p>
+            <a:pPr lvl="2"/>
+            <a:r>
+              <a:rPr lang="en-CA" dirty="0"/>
+              <a:t>Gives most control over application login</a:t>
+            </a:r>
+          </a:p>
+          <a:p>
+            <a:pPr lvl="2"/>
+            <a:r>
+              <a:rPr lang="en-CA" dirty="0"/>
+              <a:t>Reasons to use it:</a:t>
+            </a:r>
+          </a:p>
+          <a:p>
+            <a:pPr lvl="3"/>
+            <a:r>
+              <a:rPr lang="en-CA" dirty="0"/>
+              <a:t>Full control over the logic</a:t>
+            </a:r>
+          </a:p>
+          <a:p>
+            <a:pPr lvl="3"/>
+            <a:r>
+              <a:rPr lang="en-CA" dirty="0"/>
+              <a:t>Processing files and rendering async response</a:t>
+            </a:r>
+          </a:p>
+          <a:p>
+            <a:pPr lvl="3"/>
+            <a:r>
+              <a:rPr lang="en-CA" dirty="0"/>
+              <a:t>Calling other APIs/services</a:t>
+            </a:r>
+          </a:p>
+          <a:p>
+            <a:pPr lvl="3"/>
+            <a:r>
+              <a:rPr lang="en-CA" dirty="0"/>
+              <a:t>Access local files or data</a:t>
+            </a:r>
+          </a:p>
+          <a:p>
+            <a:pPr marL="914400" lvl="1" indent="-457200">
+              <a:buFont typeface="+mj-lt"/>
+              <a:buAutoNum type="arabicPeriod"/>
+            </a:pPr>
+            <a:endParaRPr lang="en-CA" dirty="0"/>
+          </a:p>
+        </p:txBody>
+      </p:sp>
+    </p:spTree>
+    <p:extLst>
+      <p:ext uri="{BB962C8B-B14F-4D97-AF65-F5344CB8AC3E}">
+        <p14:creationId xmlns:p14="http://schemas.microsoft.com/office/powerpoint/2010/main" val="1147328662"/>
+      </p:ext>
+    </p:extLst>
+  </p:cSld>
+  <p:clrMapOvr>
+    <a:masterClrMapping/>
+  </p:clrMapOvr>
+</p:sld>
+</file>
+
+<file path=ppt/slides/slide14.xml><?xml version="1.0" encoding="utf-8"?>
+<p:sld xmlns:a="http://schemas.openxmlformats.org/drawingml/2006/main" xmlns:r="http://schemas.openxmlformats.org/officeDocument/2006/relationships" xmlns:p="http://schemas.openxmlformats.org/presentationml/2006/main">
+  <p:cSld>
+    <p:spTree>
+      <p:nvGrpSpPr>
+        <p:cNvPr id="1" name=""/>
+        <p:cNvGrpSpPr/>
+        <p:nvPr/>
+      </p:nvGrpSpPr>
+      <p:grpSpPr>
+        <a:xfrm>
+          <a:off x="0" y="0"/>
+          <a:ext cx="0" cy="0"/>
+          <a:chOff x="0" y="0"/>
+          <a:chExt cx="0" cy="0"/>
+        </a:xfrm>
+      </p:grpSpPr>
+      <p:sp>
+        <p:nvSpPr>
+          <p:cNvPr id="2" name="Title 1">
+            <a:extLst>
+              <a:ext uri="{FF2B5EF4-FFF2-40B4-BE49-F238E27FC236}">
+                <a16:creationId xmlns:a16="http://schemas.microsoft.com/office/drawing/2014/main" id="{4042A4C7-987F-486F-B9FF-DE69711C9E61}"/>
+              </a:ext>
+            </a:extLst>
+          </p:cNvPr>
+          <p:cNvSpPr>
+            <a:spLocks noGrp="1"/>
+          </p:cNvSpPr>
+          <p:nvPr>
+            <p:ph type="title"/>
+          </p:nvPr>
+        </p:nvSpPr>
+        <p:spPr/>
+        <p:txBody>
+          <a:bodyPr/>
+          <a:lstStyle/>
+          <a:p>
+            <a:r>
+              <a:rPr lang="en-CA" dirty="0"/>
+              <a:t>Django REST Framework Views</a:t>
+            </a:r>
+          </a:p>
+        </p:txBody>
+      </p:sp>
+      <p:sp>
+        <p:nvSpPr>
+          <p:cNvPr id="3" name="Content Placeholder 2">
+            <a:extLst>
+              <a:ext uri="{FF2B5EF4-FFF2-40B4-BE49-F238E27FC236}">
+                <a16:creationId xmlns:a16="http://schemas.microsoft.com/office/drawing/2014/main" id="{1D2B46CB-EA97-48A7-AE83-CCDAC78164FE}"/>
+              </a:ext>
+            </a:extLst>
+          </p:cNvPr>
+          <p:cNvSpPr>
+            <a:spLocks noGrp="1"/>
+          </p:cNvSpPr>
+          <p:nvPr>
+            <p:ph idx="1"/>
+          </p:nvPr>
+        </p:nvSpPr>
+        <p:spPr/>
+        <p:txBody>
+          <a:bodyPr/>
+          <a:lstStyle/>
+          <a:p>
+            <a:r>
+              <a:rPr lang="en-CA" dirty="0" err="1"/>
+              <a:t>APIView</a:t>
+            </a:r>
+            <a:endParaRPr lang="en-CA" dirty="0"/>
+          </a:p>
+          <a:p>
+            <a:pPr lvl="1"/>
+            <a:r>
+              <a:rPr lang="en-CA" dirty="0"/>
+              <a:t>Create an </a:t>
+            </a:r>
+            <a:r>
+              <a:rPr lang="en-CA" dirty="0" err="1"/>
+              <a:t>APIView</a:t>
+            </a:r>
+            <a:r>
+              <a:rPr lang="en-CA" dirty="0"/>
+              <a:t>: </a:t>
+            </a:r>
+          </a:p>
+          <a:p>
+            <a:pPr marL="1371600" lvl="2" indent="-457200">
+              <a:buFont typeface="+mj-lt"/>
+              <a:buAutoNum type="arabicPeriod"/>
+            </a:pPr>
+            <a:r>
+              <a:rPr lang="en-CA" dirty="0"/>
+              <a:t>Add </a:t>
+            </a:r>
+            <a:r>
+              <a:rPr lang="en-CA" dirty="0" err="1"/>
+              <a:t>api</a:t>
+            </a:r>
+            <a:r>
+              <a:rPr lang="en-CA" dirty="0"/>
+              <a:t> logic to the views.py</a:t>
+            </a:r>
+          </a:p>
+          <a:p>
+            <a:pPr marL="1371600" lvl="2" indent="-457200">
+              <a:buFont typeface="+mj-lt"/>
+              <a:buAutoNum type="arabicPeriod"/>
+            </a:pPr>
+            <a:r>
+              <a:rPr lang="en-CA" dirty="0"/>
+              <a:t>Create urls.py in Django app</a:t>
+            </a:r>
+          </a:p>
+          <a:p>
+            <a:pPr marL="1371600" lvl="2" indent="-457200">
+              <a:buFont typeface="+mj-lt"/>
+              <a:buAutoNum type="arabicPeriod"/>
+            </a:pPr>
+            <a:r>
+              <a:rPr lang="en-CA" dirty="0"/>
+              <a:t>Add </a:t>
+            </a:r>
+            <a:r>
+              <a:rPr lang="en-CA" dirty="0" err="1"/>
+              <a:t>url</a:t>
+            </a:r>
+            <a:r>
+              <a:rPr lang="en-CA" dirty="0"/>
+              <a:t> to the urls.py file in Django project</a:t>
+            </a:r>
+          </a:p>
+          <a:p>
+            <a:pPr lvl="3"/>
+            <a:r>
+              <a:rPr lang="en-CA" dirty="0"/>
+              <a:t>Note: needs to add include module</a:t>
+            </a:r>
+          </a:p>
+          <a:p>
+            <a:pPr marL="1371600" lvl="2" indent="-457200">
+              <a:buFont typeface="+mj-lt"/>
+              <a:buAutoNum type="arabicPeriod"/>
+            </a:pPr>
+            <a:r>
+              <a:rPr lang="en-CA" dirty="0"/>
+              <a:t>Run the server to confirm the changes</a:t>
+            </a:r>
+          </a:p>
+          <a:p>
+            <a:pPr lvl="1"/>
+            <a:endParaRPr lang="en-CA" dirty="0"/>
+          </a:p>
+          <a:p>
+            <a:pPr lvl="1"/>
+            <a:endParaRPr lang="en-CA" dirty="0"/>
+          </a:p>
+          <a:p>
+            <a:pPr lvl="2"/>
+            <a:endParaRPr lang="en-CA" dirty="0"/>
+          </a:p>
+        </p:txBody>
+      </p:sp>
+    </p:spTree>
+    <p:extLst>
+      <p:ext uri="{BB962C8B-B14F-4D97-AF65-F5344CB8AC3E}">
+        <p14:creationId xmlns:p14="http://schemas.microsoft.com/office/powerpoint/2010/main" val="188543279"/>
+      </p:ext>
+    </p:extLst>
+  </p:cSld>
+  <p:clrMapOvr>
+    <a:masterClrMapping/>
+  </p:clrMapOvr>
+</p:sld>
+</file>
+
 <file path=ppt/slides/slide2.xml><?xml version="1.0" encoding="utf-8"?>
 <p:sld xmlns:a="http://schemas.openxmlformats.org/drawingml/2006/main" xmlns:r="http://schemas.openxmlformats.org/officeDocument/2006/relationships" xmlns:p="http://schemas.openxmlformats.org/presentationml/2006/main">
   <p:cSld>

</xml_diff>

<commit_message>
added hello viewset api
</commit_message>
<xml_diff>
--- a/setup.pptx
+++ b/setup.pptx
@@ -19,6 +19,9 @@
     <p:sldId id="269" r:id="rId13"/>
     <p:sldId id="270" r:id="rId14"/>
     <p:sldId id="271" r:id="rId15"/>
+    <p:sldId id="272" r:id="rId16"/>
+    <p:sldId id="274" r:id="rId17"/>
+    <p:sldId id="273" r:id="rId18"/>
   </p:sldIdLst>
   <p:sldSz cx="12192000" cy="6858000"/>
   <p:notesSz cx="6858000" cy="9144000"/>
@@ -4611,6 +4614,17 @@
           </a:p>
           <a:p>
             <a:pPr lvl="1"/>
+            <a:r>
+              <a:rPr lang="en-CA" dirty="0"/>
+              <a:t>Add serializers file and setup serializers for post/put requests.</a:t>
+            </a:r>
+          </a:p>
+          <a:p>
+            <a:pPr lvl="1"/>
+            <a:endParaRPr lang="en-CA" dirty="0"/>
+          </a:p>
+          <a:p>
+            <a:pPr lvl="1"/>
             <a:endParaRPr lang="en-CA" dirty="0"/>
           </a:p>
           <a:p>
@@ -4627,6 +4641,462 @@
     <p:extLst>
       <p:ext uri="{BB962C8B-B14F-4D97-AF65-F5344CB8AC3E}">
         <p14:creationId xmlns:p14="http://schemas.microsoft.com/office/powerpoint/2010/main" val="188543279"/>
+      </p:ext>
+    </p:extLst>
+  </p:cSld>
+  <p:clrMapOvr>
+    <a:masterClrMapping/>
+  </p:clrMapOvr>
+</p:sld>
+</file>
+
+<file path=ppt/slides/slide15.xml><?xml version="1.0" encoding="utf-8"?>
+<p:sld xmlns:a="http://schemas.openxmlformats.org/drawingml/2006/main" xmlns:r="http://schemas.openxmlformats.org/officeDocument/2006/relationships" xmlns:p="http://schemas.openxmlformats.org/presentationml/2006/main">
+  <p:cSld>
+    <p:spTree>
+      <p:nvGrpSpPr>
+        <p:cNvPr id="1" name=""/>
+        <p:cNvGrpSpPr/>
+        <p:nvPr/>
+      </p:nvGrpSpPr>
+      <p:grpSpPr>
+        <a:xfrm>
+          <a:off x="0" y="0"/>
+          <a:ext cx="0" cy="0"/>
+          <a:chOff x="0" y="0"/>
+          <a:chExt cx="0" cy="0"/>
+        </a:xfrm>
+      </p:grpSpPr>
+      <p:sp>
+        <p:nvSpPr>
+          <p:cNvPr id="2" name="Title 1">
+            <a:extLst>
+              <a:ext uri="{FF2B5EF4-FFF2-40B4-BE49-F238E27FC236}">
+                <a16:creationId xmlns:a16="http://schemas.microsoft.com/office/drawing/2014/main" id="{BC66FB93-794F-474E-AC1E-F381E137AF1D}"/>
+              </a:ext>
+            </a:extLst>
+          </p:cNvPr>
+          <p:cNvSpPr>
+            <a:spLocks noGrp="1"/>
+          </p:cNvSpPr>
+          <p:nvPr>
+            <p:ph type="title"/>
+          </p:nvPr>
+        </p:nvSpPr>
+        <p:spPr/>
+        <p:txBody>
+          <a:bodyPr/>
+          <a:lstStyle/>
+          <a:p>
+            <a:r>
+              <a:rPr lang="en-CA" dirty="0"/>
+              <a:t>Django REST Framework Views</a:t>
+            </a:r>
+          </a:p>
+        </p:txBody>
+      </p:sp>
+      <p:sp>
+        <p:nvSpPr>
+          <p:cNvPr id="3" name="Content Placeholder 2">
+            <a:extLst>
+              <a:ext uri="{FF2B5EF4-FFF2-40B4-BE49-F238E27FC236}">
+                <a16:creationId xmlns:a16="http://schemas.microsoft.com/office/drawing/2014/main" id="{F706FDD1-853F-4AF3-A6F9-93E4E896E93A}"/>
+              </a:ext>
+            </a:extLst>
+          </p:cNvPr>
+          <p:cNvSpPr>
+            <a:spLocks noGrp="1"/>
+          </p:cNvSpPr>
+          <p:nvPr>
+            <p:ph idx="1"/>
+          </p:nvPr>
+        </p:nvSpPr>
+        <p:spPr/>
+        <p:txBody>
+          <a:bodyPr>
+            <a:normAutofit lnSpcReduction="10000"/>
+          </a:bodyPr>
+          <a:lstStyle/>
+          <a:p>
+            <a:r>
+              <a:rPr lang="en-CA" dirty="0"/>
+              <a:t>2 ways to create an API. (</a:t>
+            </a:r>
+            <a:r>
+              <a:rPr lang="en-CA" dirty="0" err="1"/>
+              <a:t>APIView</a:t>
+            </a:r>
+            <a:r>
+              <a:rPr lang="en-CA" dirty="0"/>
+              <a:t> and a </a:t>
+            </a:r>
+            <a:r>
+              <a:rPr lang="en-CA" dirty="0" err="1"/>
+              <a:t>ViewSet</a:t>
+            </a:r>
+            <a:r>
+              <a:rPr lang="en-CA" dirty="0"/>
+              <a:t>)</a:t>
+            </a:r>
+          </a:p>
+          <a:p>
+            <a:endParaRPr lang="en-CA" dirty="0"/>
+          </a:p>
+          <a:p>
+            <a:pPr marL="914400" lvl="1" indent="-457200">
+              <a:buFont typeface="+mj-lt"/>
+              <a:buAutoNum type="arabicPeriod"/>
+            </a:pPr>
+            <a:r>
+              <a:rPr lang="en-CA" dirty="0" err="1"/>
+              <a:t>APIView</a:t>
+            </a:r>
+            <a:r>
+              <a:rPr lang="en-CA" dirty="0"/>
+              <a:t> ( previously learned</a:t>
+            </a:r>
+          </a:p>
+          <a:p>
+            <a:pPr marL="914400" lvl="1" indent="-457200">
+              <a:buFont typeface="+mj-lt"/>
+              <a:buAutoNum type="arabicPeriod"/>
+            </a:pPr>
+            <a:r>
+              <a:rPr lang="en-CA" dirty="0" err="1"/>
+              <a:t>ViewSet</a:t>
+            </a:r>
+            <a:endParaRPr lang="en-CA" dirty="0"/>
+          </a:p>
+          <a:p>
+            <a:pPr lvl="2"/>
+            <a:r>
+              <a:rPr lang="en-CA" dirty="0"/>
+              <a:t>Takes care of a lot of typical logic for us</a:t>
+            </a:r>
+          </a:p>
+          <a:p>
+            <a:pPr lvl="2"/>
+            <a:r>
+              <a:rPr lang="en-CA" dirty="0"/>
+              <a:t>Perfect for standard database operations</a:t>
+            </a:r>
+          </a:p>
+          <a:p>
+            <a:pPr lvl="2"/>
+            <a:r>
+              <a:rPr lang="en-CA" dirty="0"/>
+              <a:t>Fastest way to make a database interface</a:t>
+            </a:r>
+          </a:p>
+          <a:p>
+            <a:pPr lvl="2"/>
+            <a:r>
+              <a:rPr lang="en-CA" dirty="0"/>
+              <a:t>Reasons to use it:</a:t>
+            </a:r>
+          </a:p>
+          <a:p>
+            <a:pPr lvl="3"/>
+            <a:r>
+              <a:rPr lang="en-CA" dirty="0"/>
+              <a:t>Simple CRUD on database</a:t>
+            </a:r>
+          </a:p>
+          <a:p>
+            <a:pPr lvl="3"/>
+            <a:r>
+              <a:rPr lang="en-CA" dirty="0"/>
+              <a:t>Simple API for objects</a:t>
+            </a:r>
+          </a:p>
+          <a:p>
+            <a:pPr lvl="3"/>
+            <a:r>
+              <a:rPr lang="en-CA" dirty="0"/>
+              <a:t>Little or no customization on the logic</a:t>
+            </a:r>
+          </a:p>
+          <a:p>
+            <a:pPr lvl="3"/>
+            <a:r>
+              <a:rPr lang="en-CA" dirty="0"/>
+              <a:t>API with standard database structure.</a:t>
+            </a:r>
+          </a:p>
+        </p:txBody>
+      </p:sp>
+    </p:spTree>
+    <p:extLst>
+      <p:ext uri="{BB962C8B-B14F-4D97-AF65-F5344CB8AC3E}">
+        <p14:creationId xmlns:p14="http://schemas.microsoft.com/office/powerpoint/2010/main" val="3086928791"/>
+      </p:ext>
+    </p:extLst>
+  </p:cSld>
+  <p:clrMapOvr>
+    <a:masterClrMapping/>
+  </p:clrMapOvr>
+</p:sld>
+</file>
+
+<file path=ppt/slides/slide16.xml><?xml version="1.0" encoding="utf-8"?>
+<p:sld xmlns:a="http://schemas.openxmlformats.org/drawingml/2006/main" xmlns:r="http://schemas.openxmlformats.org/officeDocument/2006/relationships" xmlns:p="http://schemas.openxmlformats.org/presentationml/2006/main">
+  <p:cSld>
+    <p:spTree>
+      <p:nvGrpSpPr>
+        <p:cNvPr id="1" name=""/>
+        <p:cNvGrpSpPr/>
+        <p:nvPr/>
+      </p:nvGrpSpPr>
+      <p:grpSpPr>
+        <a:xfrm>
+          <a:off x="0" y="0"/>
+          <a:ext cx="0" cy="0"/>
+          <a:chOff x="0" y="0"/>
+          <a:chExt cx="0" cy="0"/>
+        </a:xfrm>
+      </p:grpSpPr>
+      <p:sp>
+        <p:nvSpPr>
+          <p:cNvPr id="2" name="Title 1">
+            <a:extLst>
+              <a:ext uri="{FF2B5EF4-FFF2-40B4-BE49-F238E27FC236}">
+                <a16:creationId xmlns:a16="http://schemas.microsoft.com/office/drawing/2014/main" id="{4042A4C7-987F-486F-B9FF-DE69711C9E61}"/>
+              </a:ext>
+            </a:extLst>
+          </p:cNvPr>
+          <p:cNvSpPr>
+            <a:spLocks noGrp="1"/>
+          </p:cNvSpPr>
+          <p:nvPr>
+            <p:ph type="title"/>
+          </p:nvPr>
+        </p:nvSpPr>
+        <p:spPr/>
+        <p:txBody>
+          <a:bodyPr/>
+          <a:lstStyle/>
+          <a:p>
+            <a:r>
+              <a:rPr lang="en-CA" dirty="0"/>
+              <a:t>Django REST Framework Views</a:t>
+            </a:r>
+          </a:p>
+        </p:txBody>
+      </p:sp>
+      <p:sp>
+        <p:nvSpPr>
+          <p:cNvPr id="3" name="Content Placeholder 2">
+            <a:extLst>
+              <a:ext uri="{FF2B5EF4-FFF2-40B4-BE49-F238E27FC236}">
+                <a16:creationId xmlns:a16="http://schemas.microsoft.com/office/drawing/2014/main" id="{1D2B46CB-EA97-48A7-AE83-CCDAC78164FE}"/>
+              </a:ext>
+            </a:extLst>
+          </p:cNvPr>
+          <p:cNvSpPr>
+            <a:spLocks noGrp="1"/>
+          </p:cNvSpPr>
+          <p:nvPr>
+            <p:ph idx="1"/>
+          </p:nvPr>
+        </p:nvSpPr>
+        <p:spPr/>
+        <p:txBody>
+          <a:bodyPr/>
+          <a:lstStyle/>
+          <a:p>
+            <a:r>
+              <a:rPr lang="en-CA" dirty="0" err="1"/>
+              <a:t>ViewSet</a:t>
+            </a:r>
+            <a:endParaRPr lang="en-CA" dirty="0"/>
+          </a:p>
+          <a:p>
+            <a:pPr lvl="1"/>
+            <a:r>
+              <a:rPr lang="en-CA" dirty="0"/>
+              <a:t>Create a </a:t>
+            </a:r>
+            <a:r>
+              <a:rPr lang="en-CA" dirty="0" err="1"/>
+              <a:t>ViewSet</a:t>
+            </a:r>
+            <a:r>
+              <a:rPr lang="en-CA" dirty="0"/>
+              <a:t> API: </a:t>
+            </a:r>
+          </a:p>
+          <a:p>
+            <a:pPr marL="1371600" lvl="2" indent="-457200">
+              <a:buFont typeface="+mj-lt"/>
+              <a:buAutoNum type="arabicPeriod"/>
+            </a:pPr>
+            <a:r>
+              <a:rPr lang="en-CA" dirty="0"/>
+              <a:t>Add </a:t>
+            </a:r>
+            <a:r>
+              <a:rPr lang="en-CA" dirty="0" err="1"/>
+              <a:t>api</a:t>
+            </a:r>
+            <a:r>
+              <a:rPr lang="en-CA" dirty="0"/>
+              <a:t> logic to the views.py</a:t>
+            </a:r>
+          </a:p>
+          <a:p>
+            <a:pPr marL="1371600" lvl="2" indent="-457200">
+              <a:buFont typeface="+mj-lt"/>
+              <a:buAutoNum type="arabicPeriod"/>
+            </a:pPr>
+            <a:r>
+              <a:rPr lang="en-CA" dirty="0"/>
+              <a:t>Create urls.py in Django app (or use the existing if you already have one)</a:t>
+            </a:r>
+          </a:p>
+          <a:p>
+            <a:pPr marL="1371600" lvl="2" indent="-457200">
+              <a:buFont typeface="+mj-lt"/>
+              <a:buAutoNum type="arabicPeriod"/>
+            </a:pPr>
+            <a:r>
+              <a:rPr lang="en-CA" dirty="0"/>
+              <a:t>Add </a:t>
+            </a:r>
+            <a:r>
+              <a:rPr lang="en-CA" dirty="0" err="1"/>
+              <a:t>url</a:t>
+            </a:r>
+            <a:r>
+              <a:rPr lang="en-CA" dirty="0"/>
+              <a:t> to the urls.py file in Django project ( if new urls.py file is created)</a:t>
+            </a:r>
+          </a:p>
+          <a:p>
+            <a:pPr lvl="3"/>
+            <a:r>
+              <a:rPr lang="en-CA" dirty="0"/>
+              <a:t>Note: needs to add include module</a:t>
+            </a:r>
+          </a:p>
+          <a:p>
+            <a:pPr marL="1371600" lvl="2" indent="-457200">
+              <a:buFont typeface="+mj-lt"/>
+              <a:buAutoNum type="arabicPeriod"/>
+            </a:pPr>
+            <a:r>
+              <a:rPr lang="en-CA" dirty="0"/>
+              <a:t>Run the server to confirm the changes</a:t>
+            </a:r>
+          </a:p>
+          <a:p>
+            <a:pPr lvl="1"/>
+            <a:r>
+              <a:rPr lang="en-CA" dirty="0"/>
+              <a:t>Add serializers file and setup serializers for post/put requests.</a:t>
+            </a:r>
+          </a:p>
+          <a:p>
+            <a:pPr lvl="1"/>
+            <a:endParaRPr lang="en-CA" dirty="0"/>
+          </a:p>
+          <a:p>
+            <a:pPr lvl="1"/>
+            <a:endParaRPr lang="en-CA" dirty="0"/>
+          </a:p>
+          <a:p>
+            <a:pPr lvl="1"/>
+            <a:endParaRPr lang="en-CA" dirty="0"/>
+          </a:p>
+          <a:p>
+            <a:pPr lvl="2"/>
+            <a:endParaRPr lang="en-CA" dirty="0"/>
+          </a:p>
+        </p:txBody>
+      </p:sp>
+    </p:spTree>
+    <p:extLst>
+      <p:ext uri="{BB962C8B-B14F-4D97-AF65-F5344CB8AC3E}">
+        <p14:creationId xmlns:p14="http://schemas.microsoft.com/office/powerpoint/2010/main" val="3605498"/>
+      </p:ext>
+    </p:extLst>
+  </p:cSld>
+  <p:clrMapOvr>
+    <a:masterClrMapping/>
+  </p:clrMapOvr>
+</p:sld>
+</file>
+
+<file path=ppt/slides/slide17.xml><?xml version="1.0" encoding="utf-8"?>
+<p:sld xmlns:a="http://schemas.openxmlformats.org/drawingml/2006/main" xmlns:r="http://schemas.openxmlformats.org/officeDocument/2006/relationships" xmlns:p="http://schemas.openxmlformats.org/presentationml/2006/main">
+  <p:cSld>
+    <p:spTree>
+      <p:nvGrpSpPr>
+        <p:cNvPr id="1" name=""/>
+        <p:cNvGrpSpPr/>
+        <p:nvPr/>
+      </p:nvGrpSpPr>
+      <p:grpSpPr>
+        <a:xfrm>
+          <a:off x="0" y="0"/>
+          <a:ext cx="0" cy="0"/>
+          <a:chOff x="0" y="0"/>
+          <a:chExt cx="0" cy="0"/>
+        </a:xfrm>
+      </p:grpSpPr>
+      <p:sp>
+        <p:nvSpPr>
+          <p:cNvPr id="2" name="Title 1">
+            <a:extLst>
+              <a:ext uri="{FF2B5EF4-FFF2-40B4-BE49-F238E27FC236}">
+                <a16:creationId xmlns:a16="http://schemas.microsoft.com/office/drawing/2014/main" id="{6B8D4CD5-B80D-4D67-AEBE-F9C6A3265559}"/>
+              </a:ext>
+            </a:extLst>
+          </p:cNvPr>
+          <p:cNvSpPr>
+            <a:spLocks noGrp="1"/>
+          </p:cNvSpPr>
+          <p:nvPr>
+            <p:ph type="title"/>
+          </p:nvPr>
+        </p:nvSpPr>
+        <p:spPr/>
+        <p:txBody>
+          <a:bodyPr/>
+          <a:lstStyle/>
+          <a:p>
+            <a:endParaRPr lang="en-CA"/>
+          </a:p>
+        </p:txBody>
+      </p:sp>
+      <p:sp>
+        <p:nvSpPr>
+          <p:cNvPr id="3" name="Content Placeholder 2">
+            <a:extLst>
+              <a:ext uri="{FF2B5EF4-FFF2-40B4-BE49-F238E27FC236}">
+                <a16:creationId xmlns:a16="http://schemas.microsoft.com/office/drawing/2014/main" id="{C91549CA-20BA-4CBB-BE39-C50EBEAE16FC}"/>
+              </a:ext>
+            </a:extLst>
+          </p:cNvPr>
+          <p:cNvSpPr>
+            <a:spLocks noGrp="1"/>
+          </p:cNvSpPr>
+          <p:nvPr>
+            <p:ph idx="1"/>
+          </p:nvPr>
+        </p:nvSpPr>
+        <p:spPr/>
+        <p:txBody>
+          <a:bodyPr/>
+          <a:lstStyle/>
+          <a:p>
+            <a:endParaRPr lang="en-CA"/>
+          </a:p>
+        </p:txBody>
+      </p:sp>
+    </p:spTree>
+    <p:extLst>
+      <p:ext uri="{BB962C8B-B14F-4D97-AF65-F5344CB8AC3E}">
+        <p14:creationId xmlns:p14="http://schemas.microsoft.com/office/powerpoint/2010/main" val="2354611164"/>
       </p:ext>
     </p:extLst>
   </p:cSld>

</xml_diff>

<commit_message>
Added user profile feed api
</commit_message>
<xml_diff>
--- a/setup.pptx
+++ b/setup.pptx
@@ -278,7 +278,7 @@
           <a:p>
             <a:fld id="{DBE5E07E-E33F-4296-ACDE-B7BF5645D92B}" type="datetimeFigureOut">
               <a:rPr lang="en-CA" smtClean="0"/>
-              <a:t>2022-01-02</a:t>
+              <a:t>2022-01-03</a:t>
             </a:fld>
             <a:endParaRPr lang="en-CA"/>
           </a:p>
@@ -478,7 +478,7 @@
           <a:p>
             <a:fld id="{DBE5E07E-E33F-4296-ACDE-B7BF5645D92B}" type="datetimeFigureOut">
               <a:rPr lang="en-CA" smtClean="0"/>
-              <a:t>2022-01-02</a:t>
+              <a:t>2022-01-03</a:t>
             </a:fld>
             <a:endParaRPr lang="en-CA"/>
           </a:p>
@@ -688,7 +688,7 @@
           <a:p>
             <a:fld id="{DBE5E07E-E33F-4296-ACDE-B7BF5645D92B}" type="datetimeFigureOut">
               <a:rPr lang="en-CA" smtClean="0"/>
-              <a:t>2022-01-02</a:t>
+              <a:t>2022-01-03</a:t>
             </a:fld>
             <a:endParaRPr lang="en-CA"/>
           </a:p>
@@ -888,7 +888,7 @@
           <a:p>
             <a:fld id="{DBE5E07E-E33F-4296-ACDE-B7BF5645D92B}" type="datetimeFigureOut">
               <a:rPr lang="en-CA" smtClean="0"/>
-              <a:t>2022-01-02</a:t>
+              <a:t>2022-01-03</a:t>
             </a:fld>
             <a:endParaRPr lang="en-CA"/>
           </a:p>
@@ -1164,7 +1164,7 @@
           <a:p>
             <a:fld id="{DBE5E07E-E33F-4296-ACDE-B7BF5645D92B}" type="datetimeFigureOut">
               <a:rPr lang="en-CA" smtClean="0"/>
-              <a:t>2022-01-02</a:t>
+              <a:t>2022-01-03</a:t>
             </a:fld>
             <a:endParaRPr lang="en-CA"/>
           </a:p>
@@ -1432,7 +1432,7 @@
           <a:p>
             <a:fld id="{DBE5E07E-E33F-4296-ACDE-B7BF5645D92B}" type="datetimeFigureOut">
               <a:rPr lang="en-CA" smtClean="0"/>
-              <a:t>2022-01-02</a:t>
+              <a:t>2022-01-03</a:t>
             </a:fld>
             <a:endParaRPr lang="en-CA"/>
           </a:p>
@@ -1847,7 +1847,7 @@
           <a:p>
             <a:fld id="{DBE5E07E-E33F-4296-ACDE-B7BF5645D92B}" type="datetimeFigureOut">
               <a:rPr lang="en-CA" smtClean="0"/>
-              <a:t>2022-01-02</a:t>
+              <a:t>2022-01-03</a:t>
             </a:fld>
             <a:endParaRPr lang="en-CA"/>
           </a:p>
@@ -1989,7 +1989,7 @@
           <a:p>
             <a:fld id="{DBE5E07E-E33F-4296-ACDE-B7BF5645D92B}" type="datetimeFigureOut">
               <a:rPr lang="en-CA" smtClean="0"/>
-              <a:t>2022-01-02</a:t>
+              <a:t>2022-01-03</a:t>
             </a:fld>
             <a:endParaRPr lang="en-CA"/>
           </a:p>
@@ -2102,7 +2102,7 @@
           <a:p>
             <a:fld id="{DBE5E07E-E33F-4296-ACDE-B7BF5645D92B}" type="datetimeFigureOut">
               <a:rPr lang="en-CA" smtClean="0"/>
-              <a:t>2022-01-02</a:t>
+              <a:t>2022-01-03</a:t>
             </a:fld>
             <a:endParaRPr lang="en-CA"/>
           </a:p>
@@ -2415,7 +2415,7 @@
           <a:p>
             <a:fld id="{DBE5E07E-E33F-4296-ACDE-B7BF5645D92B}" type="datetimeFigureOut">
               <a:rPr lang="en-CA" smtClean="0"/>
-              <a:t>2022-01-02</a:t>
+              <a:t>2022-01-03</a:t>
             </a:fld>
             <a:endParaRPr lang="en-CA"/>
           </a:p>
@@ -2704,7 +2704,7 @@
           <a:p>
             <a:fld id="{DBE5E07E-E33F-4296-ACDE-B7BF5645D92B}" type="datetimeFigureOut">
               <a:rPr lang="en-CA" smtClean="0"/>
-              <a:t>2022-01-02</a:t>
+              <a:t>2022-01-03</a:t>
             </a:fld>
             <a:endParaRPr lang="en-CA"/>
           </a:p>
@@ -2947,7 +2947,7 @@
           <a:p>
             <a:fld id="{DBE5E07E-E33F-4296-ACDE-B7BF5645D92B}" type="datetimeFigureOut">
               <a:rPr lang="en-CA" smtClean="0"/>
-              <a:t>2022-01-02</a:t>
+              <a:t>2022-01-03</a:t>
             </a:fld>
             <a:endParaRPr lang="en-CA"/>
           </a:p>
@@ -5097,7 +5097,24 @@
               <a:buFont typeface="+mj-lt"/>
               <a:buAutoNum type="arabicPeriod"/>
             </a:pPr>
-            <a:endParaRPr lang="en-CA"/>
+            <a:r>
+              <a:rPr lang="en-CA" dirty="0"/>
+              <a:t>Add a new model ( In case you’d have database)</a:t>
+            </a:r>
+          </a:p>
+          <a:p>
+            <a:pPr marL="514350" indent="-514350">
+              <a:buFont typeface="+mj-lt"/>
+              <a:buAutoNum type="arabicPeriod"/>
+            </a:pPr>
+            <a:r>
+              <a:rPr lang="en-CA" dirty="0"/>
+              <a:t>Run Migration (to reflect model to </a:t>
+            </a:r>
+            <a:r>
+              <a:rPr lang="en-CA"/>
+              <a:t>the database)</a:t>
+            </a:r>
           </a:p>
         </p:txBody>
       </p:sp>

</xml_diff>